<commit_message>
publish all topics card only
</commit_message>
<xml_diff>
--- a/topic01-introduction-to-ICT/unit-1/talk-1/a-intro.pptx
+++ b/topic01-introduction-to-ICT/unit-1/talk-1/a-intro.pptx
@@ -14496,7 +14496,7 @@
           <a:p>
             <a:fld id="{92538219-6E45-4D12-B767-46F92D5844D4}" type="datetime1">
               <a:rPr lang="en-US" smtClean="0"/>
-              <a:t>9/17/25</a:t>
+              <a:t>9/18/25</a:t>
             </a:fld>
             <a:endParaRPr lang="en-US"/>
           </a:p>
@@ -14747,7 +14747,7 @@
           <a:p>
             <a:fld id="{51FC8E16-3C03-4238-9C6F-B34F3D10F77E}" type="datetime1">
               <a:rPr lang="en-US" smtClean="0"/>
-              <a:t>9/17/25</a:t>
+              <a:t>9/18/25</a:t>
             </a:fld>
             <a:endParaRPr lang="en-US" dirty="0"/>
           </a:p>
@@ -15063,7 +15063,7 @@
           <a:p>
             <a:fld id="{51FC8E16-3C03-4238-9C6F-B34F3D10F77E}" type="datetime1">
               <a:rPr lang="en-US" smtClean="0"/>
-              <a:t>9/17/25</a:t>
+              <a:t>9/18/25</a:t>
             </a:fld>
             <a:endParaRPr lang="en-US" dirty="0"/>
           </a:p>
@@ -15398,7 +15398,7 @@
           <a:p>
             <a:fld id="{51FC8E16-3C03-4238-9C6F-B34F3D10F77E}" type="datetime1">
               <a:rPr lang="en-US" smtClean="0"/>
-              <a:t>9/17/25</a:t>
+              <a:t>9/18/25</a:t>
             </a:fld>
             <a:endParaRPr lang="en-US" dirty="0"/>
           </a:p>
@@ -15714,7 +15714,7 @@
           <a:p>
             <a:fld id="{51FC8E16-3C03-4238-9C6F-B34F3D10F77E}" type="datetime1">
               <a:rPr lang="en-US" smtClean="0"/>
-              <a:t>9/17/25</a:t>
+              <a:t>9/18/25</a:t>
             </a:fld>
             <a:endParaRPr lang="en-US" dirty="0"/>
           </a:p>
@@ -16109,7 +16109,7 @@
           <a:p>
             <a:fld id="{51FC8E16-3C03-4238-9C6F-B34F3D10F77E}" type="datetime1">
               <a:rPr lang="en-US" smtClean="0"/>
-              <a:t>9/17/25</a:t>
+              <a:t>9/18/25</a:t>
             </a:fld>
             <a:endParaRPr lang="en-US" dirty="0"/>
           </a:p>
@@ -16281,7 +16281,7 @@
           <a:p>
             <a:fld id="{836430B8-6059-41E5-A5DC-C07A76F5859A}" type="datetime1">
               <a:rPr lang="en-US" smtClean="0"/>
-              <a:t>9/17/25</a:t>
+              <a:t>9/18/25</a:t>
             </a:fld>
             <a:endParaRPr lang="en-US"/>
           </a:p>
@@ -16461,7 +16461,7 @@
           <a:p>
             <a:fld id="{A09D0CB7-D16E-4358-B7F4-EA4A24554592}" type="datetime1">
               <a:rPr lang="en-US" smtClean="0"/>
-              <a:t>9/17/25</a:t>
+              <a:t>9/18/25</a:t>
             </a:fld>
             <a:endParaRPr lang="en-US"/>
           </a:p>
@@ -17268,7 +17268,7 @@
           <a:p>
             <a:fld id="{8BB296A2-D8F0-4E17-BFD0-A6C902250D59}" type="datetime1">
               <a:rPr lang="en-US" smtClean="0"/>
-              <a:t>9/17/25</a:t>
+              <a:t>9/18/25</a:t>
             </a:fld>
             <a:endParaRPr lang="en-US"/>
           </a:p>
@@ -17515,7 +17515,7 @@
           <a:p>
             <a:fld id="{D9108C9C-1ACB-4C84-A002-C7E0E45B937A}" type="datetime1">
               <a:rPr lang="en-US" smtClean="0"/>
-              <a:t>9/17/25</a:t>
+              <a:t>9/18/25</a:t>
             </a:fld>
             <a:endParaRPr lang="en-US"/>
           </a:p>
@@ -17747,7 +17747,7 @@
           <a:p>
             <a:fld id="{F49AF2A5-B297-4977-9E5B-4D3050E23689}" type="datetime1">
               <a:rPr lang="en-US" smtClean="0"/>
-              <a:t>9/17/25</a:t>
+              <a:t>9/18/25</a:t>
             </a:fld>
             <a:endParaRPr lang="en-US"/>
           </a:p>
@@ -18121,7 +18121,7 @@
           <a:p>
             <a:fld id="{70127434-4794-409A-9547-04789BA47588}" type="datetime1">
               <a:rPr lang="en-US" smtClean="0"/>
-              <a:t>9/17/25</a:t>
+              <a:t>9/18/25</a:t>
             </a:fld>
             <a:endParaRPr lang="en-US"/>
           </a:p>
@@ -18244,7 +18244,7 @@
           <a:p>
             <a:fld id="{85658635-357A-4E3D-B824-A5CEFDB8449C}" type="datetime1">
               <a:rPr lang="en-US" smtClean="0"/>
-              <a:t>9/17/25</a:t>
+              <a:t>9/18/25</a:t>
             </a:fld>
             <a:endParaRPr lang="en-US"/>
           </a:p>
@@ -18339,7 +18339,7 @@
           <a:p>
             <a:fld id="{7E86FF77-2719-4AD0-8740-0B90FF5D1EFB}" type="datetime1">
               <a:rPr lang="en-US" smtClean="0"/>
-              <a:t>9/17/25</a:t>
+              <a:t>9/18/25</a:t>
             </a:fld>
             <a:endParaRPr lang="en-US"/>
           </a:p>
@@ -18594,7 +18594,7 @@
           <a:p>
             <a:fld id="{6E441C83-1089-48B9-8B65-293D4C236D35}" type="datetime1">
               <a:rPr lang="en-US" smtClean="0"/>
-              <a:t>9/17/25</a:t>
+              <a:t>9/18/25</a:t>
             </a:fld>
             <a:endParaRPr lang="en-US"/>
           </a:p>
@@ -18899,7 +18899,7 @@
           <a:p>
             <a:fld id="{D162FE45-CC1E-47DB-8B82-6CF0636FBDB8}" type="datetime1">
               <a:rPr lang="en-US" smtClean="0"/>
-              <a:t>9/17/25</a:t>
+              <a:t>9/18/25</a:t>
             </a:fld>
             <a:endParaRPr lang="en-US"/>
           </a:p>
@@ -19601,7 +19601,7 @@
           <a:p>
             <a:fld id="{51FC8E16-3C03-4238-9C6F-B34F3D10F77E}" type="datetime1">
               <a:rPr lang="en-US" smtClean="0"/>
-              <a:t>9/17/25</a:t>
+              <a:t>9/18/25</a:t>
             </a:fld>
             <a:endParaRPr lang="en-US" dirty="0"/>
           </a:p>
@@ -26830,6 +26830,1553 @@
   <p:clrMapOvr>
     <a:masterClrMapping/>
   </p:clrMapOvr>
+  <p:timing>
+    <p:tnLst>
+      <p:par>
+        <p:cTn id="1" dur="indefinite" restart="never" nodeType="tmRoot">
+          <p:childTnLst>
+            <p:seq concurrent="1" nextAc="seek">
+              <p:cTn id="2" dur="indefinite" nodeType="mainSeq">
+                <p:childTnLst>
+                  <p:par>
+                    <p:cTn id="3" fill="hold">
+                      <p:stCondLst>
+                        <p:cond delay="indefinite"/>
+                      </p:stCondLst>
+                      <p:childTnLst>
+                        <p:par>
+                          <p:cTn id="4" fill="hold">
+                            <p:stCondLst>
+                              <p:cond delay="0"/>
+                            </p:stCondLst>
+                            <p:childTnLst>
+                              <p:par>
+                                <p:cTn id="5" presetID="2" presetClass="entr" presetSubtype="4" fill="hold" nodeType="clickEffect">
+                                  <p:stCondLst>
+                                    <p:cond delay="0"/>
+                                  </p:stCondLst>
+                                  <p:childTnLst>
+                                    <p:set>
+                                      <p:cBhvr>
+                                        <p:cTn id="6" dur="1" fill="hold">
+                                          <p:stCondLst>
+                                            <p:cond delay="0"/>
+                                          </p:stCondLst>
+                                        </p:cTn>
+                                        <p:tgtEl>
+                                          <p:spTgt spid="3">
+                                            <p:txEl>
+                                              <p:pRg st="0" end="0"/>
+                                            </p:txEl>
+                                          </p:spTgt>
+                                        </p:tgtEl>
+                                        <p:attrNameLst>
+                                          <p:attrName>style.visibility</p:attrName>
+                                        </p:attrNameLst>
+                                      </p:cBhvr>
+                                      <p:to>
+                                        <p:strVal val="visible"/>
+                                      </p:to>
+                                    </p:set>
+                                    <p:anim calcmode="lin" valueType="num">
+                                      <p:cBhvr additive="base">
+                                        <p:cTn id="7" dur="500" fill="hold"/>
+                                        <p:tgtEl>
+                                          <p:spTgt spid="3">
+                                            <p:txEl>
+                                              <p:pRg st="0" end="0"/>
+                                            </p:txEl>
+                                          </p:spTgt>
+                                        </p:tgtEl>
+                                        <p:attrNameLst>
+                                          <p:attrName>ppt_x</p:attrName>
+                                        </p:attrNameLst>
+                                      </p:cBhvr>
+                                      <p:tavLst>
+                                        <p:tav tm="0">
+                                          <p:val>
+                                            <p:strVal val="#ppt_x"/>
+                                          </p:val>
+                                        </p:tav>
+                                        <p:tav tm="100000">
+                                          <p:val>
+                                            <p:strVal val="#ppt_x"/>
+                                          </p:val>
+                                        </p:tav>
+                                      </p:tavLst>
+                                    </p:anim>
+                                    <p:anim calcmode="lin" valueType="num">
+                                      <p:cBhvr additive="base">
+                                        <p:cTn id="8" dur="500" fill="hold"/>
+                                        <p:tgtEl>
+                                          <p:spTgt spid="3">
+                                            <p:txEl>
+                                              <p:pRg st="0" end="0"/>
+                                            </p:txEl>
+                                          </p:spTgt>
+                                        </p:tgtEl>
+                                        <p:attrNameLst>
+                                          <p:attrName>ppt_y</p:attrName>
+                                        </p:attrNameLst>
+                                      </p:cBhvr>
+                                      <p:tavLst>
+                                        <p:tav tm="0">
+                                          <p:val>
+                                            <p:strVal val="1+#ppt_h/2"/>
+                                          </p:val>
+                                        </p:tav>
+                                        <p:tav tm="100000">
+                                          <p:val>
+                                            <p:strVal val="#ppt_y"/>
+                                          </p:val>
+                                        </p:tav>
+                                      </p:tavLst>
+                                    </p:anim>
+                                  </p:childTnLst>
+                                </p:cTn>
+                              </p:par>
+                              <p:par>
+                                <p:cTn id="9" presetID="2" presetClass="entr" presetSubtype="4" fill="hold" nodeType="withEffect">
+                                  <p:stCondLst>
+                                    <p:cond delay="0"/>
+                                  </p:stCondLst>
+                                  <p:childTnLst>
+                                    <p:set>
+                                      <p:cBhvr>
+                                        <p:cTn id="10" dur="1" fill="hold">
+                                          <p:stCondLst>
+                                            <p:cond delay="0"/>
+                                          </p:stCondLst>
+                                        </p:cTn>
+                                        <p:tgtEl>
+                                          <p:spTgt spid="3">
+                                            <p:txEl>
+                                              <p:pRg st="1" end="1"/>
+                                            </p:txEl>
+                                          </p:spTgt>
+                                        </p:tgtEl>
+                                        <p:attrNameLst>
+                                          <p:attrName>style.visibility</p:attrName>
+                                        </p:attrNameLst>
+                                      </p:cBhvr>
+                                      <p:to>
+                                        <p:strVal val="visible"/>
+                                      </p:to>
+                                    </p:set>
+                                    <p:anim calcmode="lin" valueType="num">
+                                      <p:cBhvr additive="base">
+                                        <p:cTn id="11" dur="500" fill="hold"/>
+                                        <p:tgtEl>
+                                          <p:spTgt spid="3">
+                                            <p:txEl>
+                                              <p:pRg st="1" end="1"/>
+                                            </p:txEl>
+                                          </p:spTgt>
+                                        </p:tgtEl>
+                                        <p:attrNameLst>
+                                          <p:attrName>ppt_x</p:attrName>
+                                        </p:attrNameLst>
+                                      </p:cBhvr>
+                                      <p:tavLst>
+                                        <p:tav tm="0">
+                                          <p:val>
+                                            <p:strVal val="#ppt_x"/>
+                                          </p:val>
+                                        </p:tav>
+                                        <p:tav tm="100000">
+                                          <p:val>
+                                            <p:strVal val="#ppt_x"/>
+                                          </p:val>
+                                        </p:tav>
+                                      </p:tavLst>
+                                    </p:anim>
+                                    <p:anim calcmode="lin" valueType="num">
+                                      <p:cBhvr additive="base">
+                                        <p:cTn id="12" dur="500" fill="hold"/>
+                                        <p:tgtEl>
+                                          <p:spTgt spid="3">
+                                            <p:txEl>
+                                              <p:pRg st="1" end="1"/>
+                                            </p:txEl>
+                                          </p:spTgt>
+                                        </p:tgtEl>
+                                        <p:attrNameLst>
+                                          <p:attrName>ppt_y</p:attrName>
+                                        </p:attrNameLst>
+                                      </p:cBhvr>
+                                      <p:tavLst>
+                                        <p:tav tm="0">
+                                          <p:val>
+                                            <p:strVal val="1+#ppt_h/2"/>
+                                          </p:val>
+                                        </p:tav>
+                                        <p:tav tm="100000">
+                                          <p:val>
+                                            <p:strVal val="#ppt_y"/>
+                                          </p:val>
+                                        </p:tav>
+                                      </p:tavLst>
+                                    </p:anim>
+                                  </p:childTnLst>
+                                </p:cTn>
+                              </p:par>
+                              <p:par>
+                                <p:cTn id="13" presetID="2" presetClass="entr" presetSubtype="4" fill="hold" nodeType="withEffect">
+                                  <p:stCondLst>
+                                    <p:cond delay="0"/>
+                                  </p:stCondLst>
+                                  <p:childTnLst>
+                                    <p:set>
+                                      <p:cBhvr>
+                                        <p:cTn id="14" dur="1" fill="hold">
+                                          <p:stCondLst>
+                                            <p:cond delay="0"/>
+                                          </p:stCondLst>
+                                        </p:cTn>
+                                        <p:tgtEl>
+                                          <p:spTgt spid="3">
+                                            <p:txEl>
+                                              <p:pRg st="2" end="2"/>
+                                            </p:txEl>
+                                          </p:spTgt>
+                                        </p:tgtEl>
+                                        <p:attrNameLst>
+                                          <p:attrName>style.visibility</p:attrName>
+                                        </p:attrNameLst>
+                                      </p:cBhvr>
+                                      <p:to>
+                                        <p:strVal val="visible"/>
+                                      </p:to>
+                                    </p:set>
+                                    <p:anim calcmode="lin" valueType="num">
+                                      <p:cBhvr additive="base">
+                                        <p:cTn id="15" dur="500" fill="hold"/>
+                                        <p:tgtEl>
+                                          <p:spTgt spid="3">
+                                            <p:txEl>
+                                              <p:pRg st="2" end="2"/>
+                                            </p:txEl>
+                                          </p:spTgt>
+                                        </p:tgtEl>
+                                        <p:attrNameLst>
+                                          <p:attrName>ppt_x</p:attrName>
+                                        </p:attrNameLst>
+                                      </p:cBhvr>
+                                      <p:tavLst>
+                                        <p:tav tm="0">
+                                          <p:val>
+                                            <p:strVal val="#ppt_x"/>
+                                          </p:val>
+                                        </p:tav>
+                                        <p:tav tm="100000">
+                                          <p:val>
+                                            <p:strVal val="#ppt_x"/>
+                                          </p:val>
+                                        </p:tav>
+                                      </p:tavLst>
+                                    </p:anim>
+                                    <p:anim calcmode="lin" valueType="num">
+                                      <p:cBhvr additive="base">
+                                        <p:cTn id="16" dur="500" fill="hold"/>
+                                        <p:tgtEl>
+                                          <p:spTgt spid="3">
+                                            <p:txEl>
+                                              <p:pRg st="2" end="2"/>
+                                            </p:txEl>
+                                          </p:spTgt>
+                                        </p:tgtEl>
+                                        <p:attrNameLst>
+                                          <p:attrName>ppt_y</p:attrName>
+                                        </p:attrNameLst>
+                                      </p:cBhvr>
+                                      <p:tavLst>
+                                        <p:tav tm="0">
+                                          <p:val>
+                                            <p:strVal val="1+#ppt_h/2"/>
+                                          </p:val>
+                                        </p:tav>
+                                        <p:tav tm="100000">
+                                          <p:val>
+                                            <p:strVal val="#ppt_y"/>
+                                          </p:val>
+                                        </p:tav>
+                                      </p:tavLst>
+                                    </p:anim>
+                                  </p:childTnLst>
+                                </p:cTn>
+                              </p:par>
+                              <p:par>
+                                <p:cTn id="17" presetID="2" presetClass="entr" presetSubtype="4" fill="hold" nodeType="withEffect">
+                                  <p:stCondLst>
+                                    <p:cond delay="0"/>
+                                  </p:stCondLst>
+                                  <p:childTnLst>
+                                    <p:set>
+                                      <p:cBhvr>
+                                        <p:cTn id="18" dur="1" fill="hold">
+                                          <p:stCondLst>
+                                            <p:cond delay="0"/>
+                                          </p:stCondLst>
+                                        </p:cTn>
+                                        <p:tgtEl>
+                                          <p:spTgt spid="3">
+                                            <p:txEl>
+                                              <p:pRg st="3" end="3"/>
+                                            </p:txEl>
+                                          </p:spTgt>
+                                        </p:tgtEl>
+                                        <p:attrNameLst>
+                                          <p:attrName>style.visibility</p:attrName>
+                                        </p:attrNameLst>
+                                      </p:cBhvr>
+                                      <p:to>
+                                        <p:strVal val="visible"/>
+                                      </p:to>
+                                    </p:set>
+                                    <p:anim calcmode="lin" valueType="num">
+                                      <p:cBhvr additive="base">
+                                        <p:cTn id="19" dur="500" fill="hold"/>
+                                        <p:tgtEl>
+                                          <p:spTgt spid="3">
+                                            <p:txEl>
+                                              <p:pRg st="3" end="3"/>
+                                            </p:txEl>
+                                          </p:spTgt>
+                                        </p:tgtEl>
+                                        <p:attrNameLst>
+                                          <p:attrName>ppt_x</p:attrName>
+                                        </p:attrNameLst>
+                                      </p:cBhvr>
+                                      <p:tavLst>
+                                        <p:tav tm="0">
+                                          <p:val>
+                                            <p:strVal val="#ppt_x"/>
+                                          </p:val>
+                                        </p:tav>
+                                        <p:tav tm="100000">
+                                          <p:val>
+                                            <p:strVal val="#ppt_x"/>
+                                          </p:val>
+                                        </p:tav>
+                                      </p:tavLst>
+                                    </p:anim>
+                                    <p:anim calcmode="lin" valueType="num">
+                                      <p:cBhvr additive="base">
+                                        <p:cTn id="20" dur="500" fill="hold"/>
+                                        <p:tgtEl>
+                                          <p:spTgt spid="3">
+                                            <p:txEl>
+                                              <p:pRg st="3" end="3"/>
+                                            </p:txEl>
+                                          </p:spTgt>
+                                        </p:tgtEl>
+                                        <p:attrNameLst>
+                                          <p:attrName>ppt_y</p:attrName>
+                                        </p:attrNameLst>
+                                      </p:cBhvr>
+                                      <p:tavLst>
+                                        <p:tav tm="0">
+                                          <p:val>
+                                            <p:strVal val="1+#ppt_h/2"/>
+                                          </p:val>
+                                        </p:tav>
+                                        <p:tav tm="100000">
+                                          <p:val>
+                                            <p:strVal val="#ppt_y"/>
+                                          </p:val>
+                                        </p:tav>
+                                      </p:tavLst>
+                                    </p:anim>
+                                  </p:childTnLst>
+                                </p:cTn>
+                              </p:par>
+                              <p:par>
+                                <p:cTn id="21" presetID="2" presetClass="entr" presetSubtype="4" fill="hold" nodeType="withEffect">
+                                  <p:stCondLst>
+                                    <p:cond delay="0"/>
+                                  </p:stCondLst>
+                                  <p:childTnLst>
+                                    <p:set>
+                                      <p:cBhvr>
+                                        <p:cTn id="22" dur="1" fill="hold">
+                                          <p:stCondLst>
+                                            <p:cond delay="0"/>
+                                          </p:stCondLst>
+                                        </p:cTn>
+                                        <p:tgtEl>
+                                          <p:spTgt spid="3">
+                                            <p:txEl>
+                                              <p:pRg st="4" end="4"/>
+                                            </p:txEl>
+                                          </p:spTgt>
+                                        </p:tgtEl>
+                                        <p:attrNameLst>
+                                          <p:attrName>style.visibility</p:attrName>
+                                        </p:attrNameLst>
+                                      </p:cBhvr>
+                                      <p:to>
+                                        <p:strVal val="visible"/>
+                                      </p:to>
+                                    </p:set>
+                                    <p:anim calcmode="lin" valueType="num">
+                                      <p:cBhvr additive="base">
+                                        <p:cTn id="23" dur="500" fill="hold"/>
+                                        <p:tgtEl>
+                                          <p:spTgt spid="3">
+                                            <p:txEl>
+                                              <p:pRg st="4" end="4"/>
+                                            </p:txEl>
+                                          </p:spTgt>
+                                        </p:tgtEl>
+                                        <p:attrNameLst>
+                                          <p:attrName>ppt_x</p:attrName>
+                                        </p:attrNameLst>
+                                      </p:cBhvr>
+                                      <p:tavLst>
+                                        <p:tav tm="0">
+                                          <p:val>
+                                            <p:strVal val="#ppt_x"/>
+                                          </p:val>
+                                        </p:tav>
+                                        <p:tav tm="100000">
+                                          <p:val>
+                                            <p:strVal val="#ppt_x"/>
+                                          </p:val>
+                                        </p:tav>
+                                      </p:tavLst>
+                                    </p:anim>
+                                    <p:anim calcmode="lin" valueType="num">
+                                      <p:cBhvr additive="base">
+                                        <p:cTn id="24" dur="500" fill="hold"/>
+                                        <p:tgtEl>
+                                          <p:spTgt spid="3">
+                                            <p:txEl>
+                                              <p:pRg st="4" end="4"/>
+                                            </p:txEl>
+                                          </p:spTgt>
+                                        </p:tgtEl>
+                                        <p:attrNameLst>
+                                          <p:attrName>ppt_y</p:attrName>
+                                        </p:attrNameLst>
+                                      </p:cBhvr>
+                                      <p:tavLst>
+                                        <p:tav tm="0">
+                                          <p:val>
+                                            <p:strVal val="1+#ppt_h/2"/>
+                                          </p:val>
+                                        </p:tav>
+                                        <p:tav tm="100000">
+                                          <p:val>
+                                            <p:strVal val="#ppt_y"/>
+                                          </p:val>
+                                        </p:tav>
+                                      </p:tavLst>
+                                    </p:anim>
+                                  </p:childTnLst>
+                                </p:cTn>
+                              </p:par>
+                              <p:par>
+                                <p:cTn id="25" presetID="2" presetClass="entr" presetSubtype="4" fill="hold" nodeType="withEffect">
+                                  <p:stCondLst>
+                                    <p:cond delay="0"/>
+                                  </p:stCondLst>
+                                  <p:childTnLst>
+                                    <p:set>
+                                      <p:cBhvr>
+                                        <p:cTn id="26" dur="1" fill="hold">
+                                          <p:stCondLst>
+                                            <p:cond delay="0"/>
+                                          </p:stCondLst>
+                                        </p:cTn>
+                                        <p:tgtEl>
+                                          <p:spTgt spid="3">
+                                            <p:txEl>
+                                              <p:pRg st="5" end="5"/>
+                                            </p:txEl>
+                                          </p:spTgt>
+                                        </p:tgtEl>
+                                        <p:attrNameLst>
+                                          <p:attrName>style.visibility</p:attrName>
+                                        </p:attrNameLst>
+                                      </p:cBhvr>
+                                      <p:to>
+                                        <p:strVal val="visible"/>
+                                      </p:to>
+                                    </p:set>
+                                    <p:anim calcmode="lin" valueType="num">
+                                      <p:cBhvr additive="base">
+                                        <p:cTn id="27" dur="500" fill="hold"/>
+                                        <p:tgtEl>
+                                          <p:spTgt spid="3">
+                                            <p:txEl>
+                                              <p:pRg st="5" end="5"/>
+                                            </p:txEl>
+                                          </p:spTgt>
+                                        </p:tgtEl>
+                                        <p:attrNameLst>
+                                          <p:attrName>ppt_x</p:attrName>
+                                        </p:attrNameLst>
+                                      </p:cBhvr>
+                                      <p:tavLst>
+                                        <p:tav tm="0">
+                                          <p:val>
+                                            <p:strVal val="#ppt_x"/>
+                                          </p:val>
+                                        </p:tav>
+                                        <p:tav tm="100000">
+                                          <p:val>
+                                            <p:strVal val="#ppt_x"/>
+                                          </p:val>
+                                        </p:tav>
+                                      </p:tavLst>
+                                    </p:anim>
+                                    <p:anim calcmode="lin" valueType="num">
+                                      <p:cBhvr additive="base">
+                                        <p:cTn id="28" dur="500" fill="hold"/>
+                                        <p:tgtEl>
+                                          <p:spTgt spid="3">
+                                            <p:txEl>
+                                              <p:pRg st="5" end="5"/>
+                                            </p:txEl>
+                                          </p:spTgt>
+                                        </p:tgtEl>
+                                        <p:attrNameLst>
+                                          <p:attrName>ppt_y</p:attrName>
+                                        </p:attrNameLst>
+                                      </p:cBhvr>
+                                      <p:tavLst>
+                                        <p:tav tm="0">
+                                          <p:val>
+                                            <p:strVal val="1+#ppt_h/2"/>
+                                          </p:val>
+                                        </p:tav>
+                                        <p:tav tm="100000">
+                                          <p:val>
+                                            <p:strVal val="#ppt_y"/>
+                                          </p:val>
+                                        </p:tav>
+                                      </p:tavLst>
+                                    </p:anim>
+                                  </p:childTnLst>
+                                </p:cTn>
+                              </p:par>
+                              <p:par>
+                                <p:cTn id="29" presetID="2" presetClass="entr" presetSubtype="4" fill="hold" nodeType="withEffect">
+                                  <p:stCondLst>
+                                    <p:cond delay="0"/>
+                                  </p:stCondLst>
+                                  <p:childTnLst>
+                                    <p:set>
+                                      <p:cBhvr>
+                                        <p:cTn id="30" dur="1" fill="hold">
+                                          <p:stCondLst>
+                                            <p:cond delay="0"/>
+                                          </p:stCondLst>
+                                        </p:cTn>
+                                        <p:tgtEl>
+                                          <p:spTgt spid="3">
+                                            <p:txEl>
+                                              <p:pRg st="6" end="6"/>
+                                            </p:txEl>
+                                          </p:spTgt>
+                                        </p:tgtEl>
+                                        <p:attrNameLst>
+                                          <p:attrName>style.visibility</p:attrName>
+                                        </p:attrNameLst>
+                                      </p:cBhvr>
+                                      <p:to>
+                                        <p:strVal val="visible"/>
+                                      </p:to>
+                                    </p:set>
+                                    <p:anim calcmode="lin" valueType="num">
+                                      <p:cBhvr additive="base">
+                                        <p:cTn id="31" dur="500" fill="hold"/>
+                                        <p:tgtEl>
+                                          <p:spTgt spid="3">
+                                            <p:txEl>
+                                              <p:pRg st="6" end="6"/>
+                                            </p:txEl>
+                                          </p:spTgt>
+                                        </p:tgtEl>
+                                        <p:attrNameLst>
+                                          <p:attrName>ppt_x</p:attrName>
+                                        </p:attrNameLst>
+                                      </p:cBhvr>
+                                      <p:tavLst>
+                                        <p:tav tm="0">
+                                          <p:val>
+                                            <p:strVal val="#ppt_x"/>
+                                          </p:val>
+                                        </p:tav>
+                                        <p:tav tm="100000">
+                                          <p:val>
+                                            <p:strVal val="#ppt_x"/>
+                                          </p:val>
+                                        </p:tav>
+                                      </p:tavLst>
+                                    </p:anim>
+                                    <p:anim calcmode="lin" valueType="num">
+                                      <p:cBhvr additive="base">
+                                        <p:cTn id="32" dur="500" fill="hold"/>
+                                        <p:tgtEl>
+                                          <p:spTgt spid="3">
+                                            <p:txEl>
+                                              <p:pRg st="6" end="6"/>
+                                            </p:txEl>
+                                          </p:spTgt>
+                                        </p:tgtEl>
+                                        <p:attrNameLst>
+                                          <p:attrName>ppt_y</p:attrName>
+                                        </p:attrNameLst>
+                                      </p:cBhvr>
+                                      <p:tavLst>
+                                        <p:tav tm="0">
+                                          <p:val>
+                                            <p:strVal val="1+#ppt_h/2"/>
+                                          </p:val>
+                                        </p:tav>
+                                        <p:tav tm="100000">
+                                          <p:val>
+                                            <p:strVal val="#ppt_y"/>
+                                          </p:val>
+                                        </p:tav>
+                                      </p:tavLst>
+                                    </p:anim>
+                                  </p:childTnLst>
+                                </p:cTn>
+                              </p:par>
+                              <p:par>
+                                <p:cTn id="33" presetID="2" presetClass="entr" presetSubtype="4" fill="hold" nodeType="withEffect">
+                                  <p:stCondLst>
+                                    <p:cond delay="0"/>
+                                  </p:stCondLst>
+                                  <p:childTnLst>
+                                    <p:set>
+                                      <p:cBhvr>
+                                        <p:cTn id="34" dur="1" fill="hold">
+                                          <p:stCondLst>
+                                            <p:cond delay="0"/>
+                                          </p:stCondLst>
+                                        </p:cTn>
+                                        <p:tgtEl>
+                                          <p:spTgt spid="3">
+                                            <p:txEl>
+                                              <p:pRg st="7" end="7"/>
+                                            </p:txEl>
+                                          </p:spTgt>
+                                        </p:tgtEl>
+                                        <p:attrNameLst>
+                                          <p:attrName>style.visibility</p:attrName>
+                                        </p:attrNameLst>
+                                      </p:cBhvr>
+                                      <p:to>
+                                        <p:strVal val="visible"/>
+                                      </p:to>
+                                    </p:set>
+                                    <p:anim calcmode="lin" valueType="num">
+                                      <p:cBhvr additive="base">
+                                        <p:cTn id="35" dur="500" fill="hold"/>
+                                        <p:tgtEl>
+                                          <p:spTgt spid="3">
+                                            <p:txEl>
+                                              <p:pRg st="7" end="7"/>
+                                            </p:txEl>
+                                          </p:spTgt>
+                                        </p:tgtEl>
+                                        <p:attrNameLst>
+                                          <p:attrName>ppt_x</p:attrName>
+                                        </p:attrNameLst>
+                                      </p:cBhvr>
+                                      <p:tavLst>
+                                        <p:tav tm="0">
+                                          <p:val>
+                                            <p:strVal val="#ppt_x"/>
+                                          </p:val>
+                                        </p:tav>
+                                        <p:tav tm="100000">
+                                          <p:val>
+                                            <p:strVal val="#ppt_x"/>
+                                          </p:val>
+                                        </p:tav>
+                                      </p:tavLst>
+                                    </p:anim>
+                                    <p:anim calcmode="lin" valueType="num">
+                                      <p:cBhvr additive="base">
+                                        <p:cTn id="36" dur="500" fill="hold"/>
+                                        <p:tgtEl>
+                                          <p:spTgt spid="3">
+                                            <p:txEl>
+                                              <p:pRg st="7" end="7"/>
+                                            </p:txEl>
+                                          </p:spTgt>
+                                        </p:tgtEl>
+                                        <p:attrNameLst>
+                                          <p:attrName>ppt_y</p:attrName>
+                                        </p:attrNameLst>
+                                      </p:cBhvr>
+                                      <p:tavLst>
+                                        <p:tav tm="0">
+                                          <p:val>
+                                            <p:strVal val="1+#ppt_h/2"/>
+                                          </p:val>
+                                        </p:tav>
+                                        <p:tav tm="100000">
+                                          <p:val>
+                                            <p:strVal val="#ppt_y"/>
+                                          </p:val>
+                                        </p:tav>
+                                      </p:tavLst>
+                                    </p:anim>
+                                  </p:childTnLst>
+                                </p:cTn>
+                              </p:par>
+                            </p:childTnLst>
+                          </p:cTn>
+                        </p:par>
+                      </p:childTnLst>
+                    </p:cTn>
+                  </p:par>
+                  <p:par>
+                    <p:cTn id="37" fill="hold">
+                      <p:stCondLst>
+                        <p:cond delay="indefinite"/>
+                      </p:stCondLst>
+                      <p:childTnLst>
+                        <p:par>
+                          <p:cTn id="38" fill="hold">
+                            <p:stCondLst>
+                              <p:cond delay="0"/>
+                            </p:stCondLst>
+                            <p:childTnLst>
+                              <p:par>
+                                <p:cTn id="39" presetID="2" presetClass="entr" presetSubtype="4" fill="hold" nodeType="clickEffect">
+                                  <p:stCondLst>
+                                    <p:cond delay="0"/>
+                                  </p:stCondLst>
+                                  <p:childTnLst>
+                                    <p:set>
+                                      <p:cBhvr>
+                                        <p:cTn id="40" dur="1" fill="hold">
+                                          <p:stCondLst>
+                                            <p:cond delay="0"/>
+                                          </p:stCondLst>
+                                        </p:cTn>
+                                        <p:tgtEl>
+                                          <p:spTgt spid="3">
+                                            <p:txEl>
+                                              <p:pRg st="8" end="8"/>
+                                            </p:txEl>
+                                          </p:spTgt>
+                                        </p:tgtEl>
+                                        <p:attrNameLst>
+                                          <p:attrName>style.visibility</p:attrName>
+                                        </p:attrNameLst>
+                                      </p:cBhvr>
+                                      <p:to>
+                                        <p:strVal val="visible"/>
+                                      </p:to>
+                                    </p:set>
+                                    <p:anim calcmode="lin" valueType="num">
+                                      <p:cBhvr additive="base">
+                                        <p:cTn id="41" dur="500" fill="hold"/>
+                                        <p:tgtEl>
+                                          <p:spTgt spid="3">
+                                            <p:txEl>
+                                              <p:pRg st="8" end="8"/>
+                                            </p:txEl>
+                                          </p:spTgt>
+                                        </p:tgtEl>
+                                        <p:attrNameLst>
+                                          <p:attrName>ppt_x</p:attrName>
+                                        </p:attrNameLst>
+                                      </p:cBhvr>
+                                      <p:tavLst>
+                                        <p:tav tm="0">
+                                          <p:val>
+                                            <p:strVal val="#ppt_x"/>
+                                          </p:val>
+                                        </p:tav>
+                                        <p:tav tm="100000">
+                                          <p:val>
+                                            <p:strVal val="#ppt_x"/>
+                                          </p:val>
+                                        </p:tav>
+                                      </p:tavLst>
+                                    </p:anim>
+                                    <p:anim calcmode="lin" valueType="num">
+                                      <p:cBhvr additive="base">
+                                        <p:cTn id="42" dur="500" fill="hold"/>
+                                        <p:tgtEl>
+                                          <p:spTgt spid="3">
+                                            <p:txEl>
+                                              <p:pRg st="8" end="8"/>
+                                            </p:txEl>
+                                          </p:spTgt>
+                                        </p:tgtEl>
+                                        <p:attrNameLst>
+                                          <p:attrName>ppt_y</p:attrName>
+                                        </p:attrNameLst>
+                                      </p:cBhvr>
+                                      <p:tavLst>
+                                        <p:tav tm="0">
+                                          <p:val>
+                                            <p:strVal val="1+#ppt_h/2"/>
+                                          </p:val>
+                                        </p:tav>
+                                        <p:tav tm="100000">
+                                          <p:val>
+                                            <p:strVal val="#ppt_y"/>
+                                          </p:val>
+                                        </p:tav>
+                                      </p:tavLst>
+                                    </p:anim>
+                                  </p:childTnLst>
+                                </p:cTn>
+                              </p:par>
+                              <p:par>
+                                <p:cTn id="43" presetID="2" presetClass="entr" presetSubtype="4" fill="hold" nodeType="withEffect">
+                                  <p:stCondLst>
+                                    <p:cond delay="0"/>
+                                  </p:stCondLst>
+                                  <p:childTnLst>
+                                    <p:set>
+                                      <p:cBhvr>
+                                        <p:cTn id="44" dur="1" fill="hold">
+                                          <p:stCondLst>
+                                            <p:cond delay="0"/>
+                                          </p:stCondLst>
+                                        </p:cTn>
+                                        <p:tgtEl>
+                                          <p:spTgt spid="3">
+                                            <p:txEl>
+                                              <p:pRg st="9" end="9"/>
+                                            </p:txEl>
+                                          </p:spTgt>
+                                        </p:tgtEl>
+                                        <p:attrNameLst>
+                                          <p:attrName>style.visibility</p:attrName>
+                                        </p:attrNameLst>
+                                      </p:cBhvr>
+                                      <p:to>
+                                        <p:strVal val="visible"/>
+                                      </p:to>
+                                    </p:set>
+                                    <p:anim calcmode="lin" valueType="num">
+                                      <p:cBhvr additive="base">
+                                        <p:cTn id="45" dur="500" fill="hold"/>
+                                        <p:tgtEl>
+                                          <p:spTgt spid="3">
+                                            <p:txEl>
+                                              <p:pRg st="9" end="9"/>
+                                            </p:txEl>
+                                          </p:spTgt>
+                                        </p:tgtEl>
+                                        <p:attrNameLst>
+                                          <p:attrName>ppt_x</p:attrName>
+                                        </p:attrNameLst>
+                                      </p:cBhvr>
+                                      <p:tavLst>
+                                        <p:tav tm="0">
+                                          <p:val>
+                                            <p:strVal val="#ppt_x"/>
+                                          </p:val>
+                                        </p:tav>
+                                        <p:tav tm="100000">
+                                          <p:val>
+                                            <p:strVal val="#ppt_x"/>
+                                          </p:val>
+                                        </p:tav>
+                                      </p:tavLst>
+                                    </p:anim>
+                                    <p:anim calcmode="lin" valueType="num">
+                                      <p:cBhvr additive="base">
+                                        <p:cTn id="46" dur="500" fill="hold"/>
+                                        <p:tgtEl>
+                                          <p:spTgt spid="3">
+                                            <p:txEl>
+                                              <p:pRg st="9" end="9"/>
+                                            </p:txEl>
+                                          </p:spTgt>
+                                        </p:tgtEl>
+                                        <p:attrNameLst>
+                                          <p:attrName>ppt_y</p:attrName>
+                                        </p:attrNameLst>
+                                      </p:cBhvr>
+                                      <p:tavLst>
+                                        <p:tav tm="0">
+                                          <p:val>
+                                            <p:strVal val="1+#ppt_h/2"/>
+                                          </p:val>
+                                        </p:tav>
+                                        <p:tav tm="100000">
+                                          <p:val>
+                                            <p:strVal val="#ppt_y"/>
+                                          </p:val>
+                                        </p:tav>
+                                      </p:tavLst>
+                                    </p:anim>
+                                  </p:childTnLst>
+                                </p:cTn>
+                              </p:par>
+                              <p:par>
+                                <p:cTn id="47" presetID="2" presetClass="entr" presetSubtype="4" fill="hold" nodeType="withEffect">
+                                  <p:stCondLst>
+                                    <p:cond delay="0"/>
+                                  </p:stCondLst>
+                                  <p:childTnLst>
+                                    <p:set>
+                                      <p:cBhvr>
+                                        <p:cTn id="48" dur="1" fill="hold">
+                                          <p:stCondLst>
+                                            <p:cond delay="0"/>
+                                          </p:stCondLst>
+                                        </p:cTn>
+                                        <p:tgtEl>
+                                          <p:spTgt spid="3">
+                                            <p:txEl>
+                                              <p:pRg st="10" end="10"/>
+                                            </p:txEl>
+                                          </p:spTgt>
+                                        </p:tgtEl>
+                                        <p:attrNameLst>
+                                          <p:attrName>style.visibility</p:attrName>
+                                        </p:attrNameLst>
+                                      </p:cBhvr>
+                                      <p:to>
+                                        <p:strVal val="visible"/>
+                                      </p:to>
+                                    </p:set>
+                                    <p:anim calcmode="lin" valueType="num">
+                                      <p:cBhvr additive="base">
+                                        <p:cTn id="49" dur="500" fill="hold"/>
+                                        <p:tgtEl>
+                                          <p:spTgt spid="3">
+                                            <p:txEl>
+                                              <p:pRg st="10" end="10"/>
+                                            </p:txEl>
+                                          </p:spTgt>
+                                        </p:tgtEl>
+                                        <p:attrNameLst>
+                                          <p:attrName>ppt_x</p:attrName>
+                                        </p:attrNameLst>
+                                      </p:cBhvr>
+                                      <p:tavLst>
+                                        <p:tav tm="0">
+                                          <p:val>
+                                            <p:strVal val="#ppt_x"/>
+                                          </p:val>
+                                        </p:tav>
+                                        <p:tav tm="100000">
+                                          <p:val>
+                                            <p:strVal val="#ppt_x"/>
+                                          </p:val>
+                                        </p:tav>
+                                      </p:tavLst>
+                                    </p:anim>
+                                    <p:anim calcmode="lin" valueType="num">
+                                      <p:cBhvr additive="base">
+                                        <p:cTn id="50" dur="500" fill="hold"/>
+                                        <p:tgtEl>
+                                          <p:spTgt spid="3">
+                                            <p:txEl>
+                                              <p:pRg st="10" end="10"/>
+                                            </p:txEl>
+                                          </p:spTgt>
+                                        </p:tgtEl>
+                                        <p:attrNameLst>
+                                          <p:attrName>ppt_y</p:attrName>
+                                        </p:attrNameLst>
+                                      </p:cBhvr>
+                                      <p:tavLst>
+                                        <p:tav tm="0">
+                                          <p:val>
+                                            <p:strVal val="1+#ppt_h/2"/>
+                                          </p:val>
+                                        </p:tav>
+                                        <p:tav tm="100000">
+                                          <p:val>
+                                            <p:strVal val="#ppt_y"/>
+                                          </p:val>
+                                        </p:tav>
+                                      </p:tavLst>
+                                    </p:anim>
+                                  </p:childTnLst>
+                                </p:cTn>
+                              </p:par>
+                            </p:childTnLst>
+                          </p:cTn>
+                        </p:par>
+                      </p:childTnLst>
+                    </p:cTn>
+                  </p:par>
+                  <p:par>
+                    <p:cTn id="51" fill="hold">
+                      <p:stCondLst>
+                        <p:cond delay="indefinite"/>
+                      </p:stCondLst>
+                      <p:childTnLst>
+                        <p:par>
+                          <p:cTn id="52" fill="hold">
+                            <p:stCondLst>
+                              <p:cond delay="0"/>
+                            </p:stCondLst>
+                            <p:childTnLst>
+                              <p:par>
+                                <p:cTn id="53" presetID="2" presetClass="entr" presetSubtype="4" fill="hold" nodeType="clickEffect">
+                                  <p:stCondLst>
+                                    <p:cond delay="0"/>
+                                  </p:stCondLst>
+                                  <p:childTnLst>
+                                    <p:set>
+                                      <p:cBhvr>
+                                        <p:cTn id="54" dur="1" fill="hold">
+                                          <p:stCondLst>
+                                            <p:cond delay="0"/>
+                                          </p:stCondLst>
+                                        </p:cTn>
+                                        <p:tgtEl>
+                                          <p:spTgt spid="3">
+                                            <p:txEl>
+                                              <p:pRg st="11" end="11"/>
+                                            </p:txEl>
+                                          </p:spTgt>
+                                        </p:tgtEl>
+                                        <p:attrNameLst>
+                                          <p:attrName>style.visibility</p:attrName>
+                                        </p:attrNameLst>
+                                      </p:cBhvr>
+                                      <p:to>
+                                        <p:strVal val="visible"/>
+                                      </p:to>
+                                    </p:set>
+                                    <p:anim calcmode="lin" valueType="num">
+                                      <p:cBhvr additive="base">
+                                        <p:cTn id="55" dur="500" fill="hold"/>
+                                        <p:tgtEl>
+                                          <p:spTgt spid="3">
+                                            <p:txEl>
+                                              <p:pRg st="11" end="11"/>
+                                            </p:txEl>
+                                          </p:spTgt>
+                                        </p:tgtEl>
+                                        <p:attrNameLst>
+                                          <p:attrName>ppt_x</p:attrName>
+                                        </p:attrNameLst>
+                                      </p:cBhvr>
+                                      <p:tavLst>
+                                        <p:tav tm="0">
+                                          <p:val>
+                                            <p:strVal val="#ppt_x"/>
+                                          </p:val>
+                                        </p:tav>
+                                        <p:tav tm="100000">
+                                          <p:val>
+                                            <p:strVal val="#ppt_x"/>
+                                          </p:val>
+                                        </p:tav>
+                                      </p:tavLst>
+                                    </p:anim>
+                                    <p:anim calcmode="lin" valueType="num">
+                                      <p:cBhvr additive="base">
+                                        <p:cTn id="56" dur="500" fill="hold"/>
+                                        <p:tgtEl>
+                                          <p:spTgt spid="3">
+                                            <p:txEl>
+                                              <p:pRg st="11" end="11"/>
+                                            </p:txEl>
+                                          </p:spTgt>
+                                        </p:tgtEl>
+                                        <p:attrNameLst>
+                                          <p:attrName>ppt_y</p:attrName>
+                                        </p:attrNameLst>
+                                      </p:cBhvr>
+                                      <p:tavLst>
+                                        <p:tav tm="0">
+                                          <p:val>
+                                            <p:strVal val="1+#ppt_h/2"/>
+                                          </p:val>
+                                        </p:tav>
+                                        <p:tav tm="100000">
+                                          <p:val>
+                                            <p:strVal val="#ppt_y"/>
+                                          </p:val>
+                                        </p:tav>
+                                      </p:tavLst>
+                                    </p:anim>
+                                  </p:childTnLst>
+                                </p:cTn>
+                              </p:par>
+                              <p:par>
+                                <p:cTn id="57" presetID="2" presetClass="entr" presetSubtype="4" fill="hold" nodeType="withEffect">
+                                  <p:stCondLst>
+                                    <p:cond delay="0"/>
+                                  </p:stCondLst>
+                                  <p:childTnLst>
+                                    <p:set>
+                                      <p:cBhvr>
+                                        <p:cTn id="58" dur="1" fill="hold">
+                                          <p:stCondLst>
+                                            <p:cond delay="0"/>
+                                          </p:stCondLst>
+                                        </p:cTn>
+                                        <p:tgtEl>
+                                          <p:spTgt spid="3">
+                                            <p:txEl>
+                                              <p:pRg st="12" end="12"/>
+                                            </p:txEl>
+                                          </p:spTgt>
+                                        </p:tgtEl>
+                                        <p:attrNameLst>
+                                          <p:attrName>style.visibility</p:attrName>
+                                        </p:attrNameLst>
+                                      </p:cBhvr>
+                                      <p:to>
+                                        <p:strVal val="visible"/>
+                                      </p:to>
+                                    </p:set>
+                                    <p:anim calcmode="lin" valueType="num">
+                                      <p:cBhvr additive="base">
+                                        <p:cTn id="59" dur="500" fill="hold"/>
+                                        <p:tgtEl>
+                                          <p:spTgt spid="3">
+                                            <p:txEl>
+                                              <p:pRg st="12" end="12"/>
+                                            </p:txEl>
+                                          </p:spTgt>
+                                        </p:tgtEl>
+                                        <p:attrNameLst>
+                                          <p:attrName>ppt_x</p:attrName>
+                                        </p:attrNameLst>
+                                      </p:cBhvr>
+                                      <p:tavLst>
+                                        <p:tav tm="0">
+                                          <p:val>
+                                            <p:strVal val="#ppt_x"/>
+                                          </p:val>
+                                        </p:tav>
+                                        <p:tav tm="100000">
+                                          <p:val>
+                                            <p:strVal val="#ppt_x"/>
+                                          </p:val>
+                                        </p:tav>
+                                      </p:tavLst>
+                                    </p:anim>
+                                    <p:anim calcmode="lin" valueType="num">
+                                      <p:cBhvr additive="base">
+                                        <p:cTn id="60" dur="500" fill="hold"/>
+                                        <p:tgtEl>
+                                          <p:spTgt spid="3">
+                                            <p:txEl>
+                                              <p:pRg st="12" end="12"/>
+                                            </p:txEl>
+                                          </p:spTgt>
+                                        </p:tgtEl>
+                                        <p:attrNameLst>
+                                          <p:attrName>ppt_y</p:attrName>
+                                        </p:attrNameLst>
+                                      </p:cBhvr>
+                                      <p:tavLst>
+                                        <p:tav tm="0">
+                                          <p:val>
+                                            <p:strVal val="1+#ppt_h/2"/>
+                                          </p:val>
+                                        </p:tav>
+                                        <p:tav tm="100000">
+                                          <p:val>
+                                            <p:strVal val="#ppt_y"/>
+                                          </p:val>
+                                        </p:tav>
+                                      </p:tavLst>
+                                    </p:anim>
+                                  </p:childTnLst>
+                                </p:cTn>
+                              </p:par>
+                              <p:par>
+                                <p:cTn id="61" presetID="2" presetClass="entr" presetSubtype="4" fill="hold" nodeType="withEffect">
+                                  <p:stCondLst>
+                                    <p:cond delay="0"/>
+                                  </p:stCondLst>
+                                  <p:childTnLst>
+                                    <p:set>
+                                      <p:cBhvr>
+                                        <p:cTn id="62" dur="1" fill="hold">
+                                          <p:stCondLst>
+                                            <p:cond delay="0"/>
+                                          </p:stCondLst>
+                                        </p:cTn>
+                                        <p:tgtEl>
+                                          <p:spTgt spid="3">
+                                            <p:txEl>
+                                              <p:pRg st="13" end="13"/>
+                                            </p:txEl>
+                                          </p:spTgt>
+                                        </p:tgtEl>
+                                        <p:attrNameLst>
+                                          <p:attrName>style.visibility</p:attrName>
+                                        </p:attrNameLst>
+                                      </p:cBhvr>
+                                      <p:to>
+                                        <p:strVal val="visible"/>
+                                      </p:to>
+                                    </p:set>
+                                    <p:anim calcmode="lin" valueType="num">
+                                      <p:cBhvr additive="base">
+                                        <p:cTn id="63" dur="500" fill="hold"/>
+                                        <p:tgtEl>
+                                          <p:spTgt spid="3">
+                                            <p:txEl>
+                                              <p:pRg st="13" end="13"/>
+                                            </p:txEl>
+                                          </p:spTgt>
+                                        </p:tgtEl>
+                                        <p:attrNameLst>
+                                          <p:attrName>ppt_x</p:attrName>
+                                        </p:attrNameLst>
+                                      </p:cBhvr>
+                                      <p:tavLst>
+                                        <p:tav tm="0">
+                                          <p:val>
+                                            <p:strVal val="#ppt_x"/>
+                                          </p:val>
+                                        </p:tav>
+                                        <p:tav tm="100000">
+                                          <p:val>
+                                            <p:strVal val="#ppt_x"/>
+                                          </p:val>
+                                        </p:tav>
+                                      </p:tavLst>
+                                    </p:anim>
+                                    <p:anim calcmode="lin" valueType="num">
+                                      <p:cBhvr additive="base">
+                                        <p:cTn id="64" dur="500" fill="hold"/>
+                                        <p:tgtEl>
+                                          <p:spTgt spid="3">
+                                            <p:txEl>
+                                              <p:pRg st="13" end="13"/>
+                                            </p:txEl>
+                                          </p:spTgt>
+                                        </p:tgtEl>
+                                        <p:attrNameLst>
+                                          <p:attrName>ppt_y</p:attrName>
+                                        </p:attrNameLst>
+                                      </p:cBhvr>
+                                      <p:tavLst>
+                                        <p:tav tm="0">
+                                          <p:val>
+                                            <p:strVal val="1+#ppt_h/2"/>
+                                          </p:val>
+                                        </p:tav>
+                                        <p:tav tm="100000">
+                                          <p:val>
+                                            <p:strVal val="#ppt_y"/>
+                                          </p:val>
+                                        </p:tav>
+                                      </p:tavLst>
+                                    </p:anim>
+                                  </p:childTnLst>
+                                </p:cTn>
+                              </p:par>
+                            </p:childTnLst>
+                          </p:cTn>
+                        </p:par>
+                      </p:childTnLst>
+                    </p:cTn>
+                  </p:par>
+                  <p:par>
+                    <p:cTn id="65" fill="hold">
+                      <p:stCondLst>
+                        <p:cond delay="indefinite"/>
+                      </p:stCondLst>
+                      <p:childTnLst>
+                        <p:par>
+                          <p:cTn id="66" fill="hold">
+                            <p:stCondLst>
+                              <p:cond delay="0"/>
+                            </p:stCondLst>
+                            <p:childTnLst>
+                              <p:par>
+                                <p:cTn id="67" presetID="2" presetClass="entr" presetSubtype="4" fill="hold" nodeType="clickEffect">
+                                  <p:stCondLst>
+                                    <p:cond delay="0"/>
+                                  </p:stCondLst>
+                                  <p:childTnLst>
+                                    <p:set>
+                                      <p:cBhvr>
+                                        <p:cTn id="68" dur="1" fill="hold">
+                                          <p:stCondLst>
+                                            <p:cond delay="0"/>
+                                          </p:stCondLst>
+                                        </p:cTn>
+                                        <p:tgtEl>
+                                          <p:spTgt spid="3">
+                                            <p:txEl>
+                                              <p:pRg st="14" end="14"/>
+                                            </p:txEl>
+                                          </p:spTgt>
+                                        </p:tgtEl>
+                                        <p:attrNameLst>
+                                          <p:attrName>style.visibility</p:attrName>
+                                        </p:attrNameLst>
+                                      </p:cBhvr>
+                                      <p:to>
+                                        <p:strVal val="visible"/>
+                                      </p:to>
+                                    </p:set>
+                                    <p:anim calcmode="lin" valueType="num">
+                                      <p:cBhvr additive="base">
+                                        <p:cTn id="69" dur="500" fill="hold"/>
+                                        <p:tgtEl>
+                                          <p:spTgt spid="3">
+                                            <p:txEl>
+                                              <p:pRg st="14" end="14"/>
+                                            </p:txEl>
+                                          </p:spTgt>
+                                        </p:tgtEl>
+                                        <p:attrNameLst>
+                                          <p:attrName>ppt_x</p:attrName>
+                                        </p:attrNameLst>
+                                      </p:cBhvr>
+                                      <p:tavLst>
+                                        <p:tav tm="0">
+                                          <p:val>
+                                            <p:strVal val="#ppt_x"/>
+                                          </p:val>
+                                        </p:tav>
+                                        <p:tav tm="100000">
+                                          <p:val>
+                                            <p:strVal val="#ppt_x"/>
+                                          </p:val>
+                                        </p:tav>
+                                      </p:tavLst>
+                                    </p:anim>
+                                    <p:anim calcmode="lin" valueType="num">
+                                      <p:cBhvr additive="base">
+                                        <p:cTn id="70" dur="500" fill="hold"/>
+                                        <p:tgtEl>
+                                          <p:spTgt spid="3">
+                                            <p:txEl>
+                                              <p:pRg st="14" end="14"/>
+                                            </p:txEl>
+                                          </p:spTgt>
+                                        </p:tgtEl>
+                                        <p:attrNameLst>
+                                          <p:attrName>ppt_y</p:attrName>
+                                        </p:attrNameLst>
+                                      </p:cBhvr>
+                                      <p:tavLst>
+                                        <p:tav tm="0">
+                                          <p:val>
+                                            <p:strVal val="1+#ppt_h/2"/>
+                                          </p:val>
+                                        </p:tav>
+                                        <p:tav tm="100000">
+                                          <p:val>
+                                            <p:strVal val="#ppt_y"/>
+                                          </p:val>
+                                        </p:tav>
+                                      </p:tavLst>
+                                    </p:anim>
+                                  </p:childTnLst>
+                                </p:cTn>
+                              </p:par>
+                              <p:par>
+                                <p:cTn id="71" presetID="2" presetClass="entr" presetSubtype="4" fill="hold" nodeType="withEffect">
+                                  <p:stCondLst>
+                                    <p:cond delay="0"/>
+                                  </p:stCondLst>
+                                  <p:childTnLst>
+                                    <p:set>
+                                      <p:cBhvr>
+                                        <p:cTn id="72" dur="1" fill="hold">
+                                          <p:stCondLst>
+                                            <p:cond delay="0"/>
+                                          </p:stCondLst>
+                                        </p:cTn>
+                                        <p:tgtEl>
+                                          <p:spTgt spid="3">
+                                            <p:txEl>
+                                              <p:pRg st="15" end="15"/>
+                                            </p:txEl>
+                                          </p:spTgt>
+                                        </p:tgtEl>
+                                        <p:attrNameLst>
+                                          <p:attrName>style.visibility</p:attrName>
+                                        </p:attrNameLst>
+                                      </p:cBhvr>
+                                      <p:to>
+                                        <p:strVal val="visible"/>
+                                      </p:to>
+                                    </p:set>
+                                    <p:anim calcmode="lin" valueType="num">
+                                      <p:cBhvr additive="base">
+                                        <p:cTn id="73" dur="500" fill="hold"/>
+                                        <p:tgtEl>
+                                          <p:spTgt spid="3">
+                                            <p:txEl>
+                                              <p:pRg st="15" end="15"/>
+                                            </p:txEl>
+                                          </p:spTgt>
+                                        </p:tgtEl>
+                                        <p:attrNameLst>
+                                          <p:attrName>ppt_x</p:attrName>
+                                        </p:attrNameLst>
+                                      </p:cBhvr>
+                                      <p:tavLst>
+                                        <p:tav tm="0">
+                                          <p:val>
+                                            <p:strVal val="#ppt_x"/>
+                                          </p:val>
+                                        </p:tav>
+                                        <p:tav tm="100000">
+                                          <p:val>
+                                            <p:strVal val="#ppt_x"/>
+                                          </p:val>
+                                        </p:tav>
+                                      </p:tavLst>
+                                    </p:anim>
+                                    <p:anim calcmode="lin" valueType="num">
+                                      <p:cBhvr additive="base">
+                                        <p:cTn id="74" dur="500" fill="hold"/>
+                                        <p:tgtEl>
+                                          <p:spTgt spid="3">
+                                            <p:txEl>
+                                              <p:pRg st="15" end="15"/>
+                                            </p:txEl>
+                                          </p:spTgt>
+                                        </p:tgtEl>
+                                        <p:attrNameLst>
+                                          <p:attrName>ppt_y</p:attrName>
+                                        </p:attrNameLst>
+                                      </p:cBhvr>
+                                      <p:tavLst>
+                                        <p:tav tm="0">
+                                          <p:val>
+                                            <p:strVal val="1+#ppt_h/2"/>
+                                          </p:val>
+                                        </p:tav>
+                                        <p:tav tm="100000">
+                                          <p:val>
+                                            <p:strVal val="#ppt_y"/>
+                                          </p:val>
+                                        </p:tav>
+                                      </p:tavLst>
+                                    </p:anim>
+                                  </p:childTnLst>
+                                </p:cTn>
+                              </p:par>
+                              <p:par>
+                                <p:cTn id="75" presetID="2" presetClass="entr" presetSubtype="4" fill="hold" nodeType="withEffect">
+                                  <p:stCondLst>
+                                    <p:cond delay="0"/>
+                                  </p:stCondLst>
+                                  <p:childTnLst>
+                                    <p:set>
+                                      <p:cBhvr>
+                                        <p:cTn id="76" dur="1" fill="hold">
+                                          <p:stCondLst>
+                                            <p:cond delay="0"/>
+                                          </p:stCondLst>
+                                        </p:cTn>
+                                        <p:tgtEl>
+                                          <p:spTgt spid="3">
+                                            <p:txEl>
+                                              <p:pRg st="16" end="16"/>
+                                            </p:txEl>
+                                          </p:spTgt>
+                                        </p:tgtEl>
+                                        <p:attrNameLst>
+                                          <p:attrName>style.visibility</p:attrName>
+                                        </p:attrNameLst>
+                                      </p:cBhvr>
+                                      <p:to>
+                                        <p:strVal val="visible"/>
+                                      </p:to>
+                                    </p:set>
+                                    <p:anim calcmode="lin" valueType="num">
+                                      <p:cBhvr additive="base">
+                                        <p:cTn id="77" dur="500" fill="hold"/>
+                                        <p:tgtEl>
+                                          <p:spTgt spid="3">
+                                            <p:txEl>
+                                              <p:pRg st="16" end="16"/>
+                                            </p:txEl>
+                                          </p:spTgt>
+                                        </p:tgtEl>
+                                        <p:attrNameLst>
+                                          <p:attrName>ppt_x</p:attrName>
+                                        </p:attrNameLst>
+                                      </p:cBhvr>
+                                      <p:tavLst>
+                                        <p:tav tm="0">
+                                          <p:val>
+                                            <p:strVal val="#ppt_x"/>
+                                          </p:val>
+                                        </p:tav>
+                                        <p:tav tm="100000">
+                                          <p:val>
+                                            <p:strVal val="#ppt_x"/>
+                                          </p:val>
+                                        </p:tav>
+                                      </p:tavLst>
+                                    </p:anim>
+                                    <p:anim calcmode="lin" valueType="num">
+                                      <p:cBhvr additive="base">
+                                        <p:cTn id="78" dur="500" fill="hold"/>
+                                        <p:tgtEl>
+                                          <p:spTgt spid="3">
+                                            <p:txEl>
+                                              <p:pRg st="16" end="16"/>
+                                            </p:txEl>
+                                          </p:spTgt>
+                                        </p:tgtEl>
+                                        <p:attrNameLst>
+                                          <p:attrName>ppt_y</p:attrName>
+                                        </p:attrNameLst>
+                                      </p:cBhvr>
+                                      <p:tavLst>
+                                        <p:tav tm="0">
+                                          <p:val>
+                                            <p:strVal val="1+#ppt_h/2"/>
+                                          </p:val>
+                                        </p:tav>
+                                        <p:tav tm="100000">
+                                          <p:val>
+                                            <p:strVal val="#ppt_y"/>
+                                          </p:val>
+                                        </p:tav>
+                                      </p:tavLst>
+                                    </p:anim>
+                                  </p:childTnLst>
+                                </p:cTn>
+                              </p:par>
+                            </p:childTnLst>
+                          </p:cTn>
+                        </p:par>
+                      </p:childTnLst>
+                    </p:cTn>
+                  </p:par>
+                </p:childTnLst>
+              </p:cTn>
+              <p:prevCondLst>
+                <p:cond evt="onPrev" delay="0">
+                  <p:tgtEl>
+                    <p:sldTgt/>
+                  </p:tgtEl>
+                </p:cond>
+              </p:prevCondLst>
+              <p:nextCondLst>
+                <p:cond evt="onNext" delay="0">
+                  <p:tgtEl>
+                    <p:sldTgt/>
+                  </p:tgtEl>
+                </p:cond>
+              </p:nextCondLst>
+            </p:seq>
+          </p:childTnLst>
+        </p:cTn>
+      </p:par>
+    </p:tnLst>
+  </p:timing>
 </p:sld>
 </file>
 
@@ -28605,6 +30152,132 @@
   <p:clrMapOvr>
     <a:masterClrMapping/>
   </p:clrMapOvr>
+  <p:timing>
+    <p:tnLst>
+      <p:par>
+        <p:cTn id="1" dur="indefinite" restart="never" nodeType="tmRoot">
+          <p:childTnLst>
+            <p:seq concurrent="1" nextAc="seek">
+              <p:cTn id="2" dur="indefinite" nodeType="mainSeq">
+                <p:childTnLst>
+                  <p:par>
+                    <p:cTn id="3" fill="hold">
+                      <p:stCondLst>
+                        <p:cond delay="indefinite"/>
+                      </p:stCondLst>
+                      <p:childTnLst>
+                        <p:par>
+                          <p:cTn id="4" fill="hold">
+                            <p:stCondLst>
+                              <p:cond delay="0"/>
+                            </p:stCondLst>
+                            <p:childTnLst>
+                              <p:par>
+                                <p:cTn id="5" presetID="2" presetClass="entr" presetSubtype="4" fill="hold" grpId="0" nodeType="clickEffect">
+                                  <p:stCondLst>
+                                    <p:cond delay="0"/>
+                                  </p:stCondLst>
+                                  <p:childTnLst>
+                                    <p:set>
+                                      <p:cBhvr>
+                                        <p:cTn id="6" dur="1" fill="hold">
+                                          <p:stCondLst>
+                                            <p:cond delay="0"/>
+                                          </p:stCondLst>
+                                        </p:cTn>
+                                        <p:tgtEl>
+                                          <p:spTgt spid="46"/>
+                                        </p:tgtEl>
+                                        <p:attrNameLst>
+                                          <p:attrName>style.visibility</p:attrName>
+                                        </p:attrNameLst>
+                                      </p:cBhvr>
+                                      <p:to>
+                                        <p:strVal val="visible"/>
+                                      </p:to>
+                                    </p:set>
+                                    <p:anim calcmode="lin" valueType="num">
+                                      <p:cBhvr additive="base">
+                                        <p:cTn id="7" dur="500" fill="hold"/>
+                                        <p:tgtEl>
+                                          <p:spTgt spid="46"/>
+                                        </p:tgtEl>
+                                        <p:attrNameLst>
+                                          <p:attrName>ppt_x</p:attrName>
+                                        </p:attrNameLst>
+                                      </p:cBhvr>
+                                      <p:tavLst>
+                                        <p:tav tm="0">
+                                          <p:val>
+                                            <p:strVal val="#ppt_x"/>
+                                          </p:val>
+                                        </p:tav>
+                                        <p:tav tm="100000">
+                                          <p:val>
+                                            <p:strVal val="#ppt_x"/>
+                                          </p:val>
+                                        </p:tav>
+                                      </p:tavLst>
+                                    </p:anim>
+                                    <p:anim calcmode="lin" valueType="num">
+                                      <p:cBhvr additive="base">
+                                        <p:cTn id="8" dur="500" fill="hold"/>
+                                        <p:tgtEl>
+                                          <p:spTgt spid="46"/>
+                                        </p:tgtEl>
+                                        <p:attrNameLst>
+                                          <p:attrName>ppt_y</p:attrName>
+                                        </p:attrNameLst>
+                                      </p:cBhvr>
+                                      <p:tavLst>
+                                        <p:tav tm="0">
+                                          <p:val>
+                                            <p:strVal val="1+#ppt_h/2"/>
+                                          </p:val>
+                                        </p:tav>
+                                        <p:tav tm="100000">
+                                          <p:val>
+                                            <p:strVal val="#ppt_y"/>
+                                          </p:val>
+                                        </p:tav>
+                                      </p:tavLst>
+                                    </p:anim>
+                                  </p:childTnLst>
+                                </p:cTn>
+                              </p:par>
+                            </p:childTnLst>
+                          </p:cTn>
+                        </p:par>
+                      </p:childTnLst>
+                    </p:cTn>
+                  </p:par>
+                </p:childTnLst>
+              </p:cTn>
+              <p:prevCondLst>
+                <p:cond evt="onPrev" delay="0">
+                  <p:tgtEl>
+                    <p:sldTgt/>
+                  </p:tgtEl>
+                </p:cond>
+              </p:prevCondLst>
+              <p:nextCondLst>
+                <p:cond evt="onNext" delay="0">
+                  <p:tgtEl>
+                    <p:sldTgt/>
+                  </p:tgtEl>
+                </p:cond>
+              </p:nextCondLst>
+            </p:seq>
+          </p:childTnLst>
+        </p:cTn>
+      </p:par>
+    </p:tnLst>
+    <p:bldLst>
+      <p:bldGraphic spid="46" grpId="0">
+        <p:bldAsOne/>
+      </p:bldGraphic>
+    </p:bldLst>
+  </p:timing>
 </p:sld>
 </file>
 
@@ -28888,6 +30561,448 @@
   <p:clrMapOvr>
     <a:overrideClrMapping bg1="lt1" tx1="dk1" bg2="lt2" tx2="dk2" accent1="accent1" accent2="accent2" accent3="accent3" accent4="accent4" accent5="accent5" accent6="accent6" hlink="hlink" folHlink="folHlink"/>
   </p:clrMapOvr>
+  <p:timing>
+    <p:tnLst>
+      <p:par>
+        <p:cTn id="1" dur="indefinite" restart="never" nodeType="tmRoot">
+          <p:childTnLst>
+            <p:seq concurrent="1" nextAc="seek">
+              <p:cTn id="2" dur="indefinite" nodeType="mainSeq">
+                <p:childTnLst>
+                  <p:par>
+                    <p:cTn id="3" fill="hold">
+                      <p:stCondLst>
+                        <p:cond delay="indefinite"/>
+                      </p:stCondLst>
+                      <p:childTnLst>
+                        <p:par>
+                          <p:cTn id="4" fill="hold">
+                            <p:stCondLst>
+                              <p:cond delay="0"/>
+                            </p:stCondLst>
+                            <p:childTnLst>
+                              <p:par>
+                                <p:cTn id="5" presetID="2" presetClass="entr" presetSubtype="4" fill="hold" nodeType="clickEffect">
+                                  <p:stCondLst>
+                                    <p:cond delay="0"/>
+                                  </p:stCondLst>
+                                  <p:childTnLst>
+                                    <p:set>
+                                      <p:cBhvr>
+                                        <p:cTn id="6" dur="1" fill="hold">
+                                          <p:stCondLst>
+                                            <p:cond delay="0"/>
+                                          </p:stCondLst>
+                                        </p:cTn>
+                                        <p:tgtEl>
+                                          <p:spTgt spid="6">
+                                            <p:txEl>
+                                              <p:pRg st="2" end="2"/>
+                                            </p:txEl>
+                                          </p:spTgt>
+                                        </p:tgtEl>
+                                        <p:attrNameLst>
+                                          <p:attrName>style.visibility</p:attrName>
+                                        </p:attrNameLst>
+                                      </p:cBhvr>
+                                      <p:to>
+                                        <p:strVal val="visible"/>
+                                      </p:to>
+                                    </p:set>
+                                    <p:anim calcmode="lin" valueType="num">
+                                      <p:cBhvr additive="base">
+                                        <p:cTn id="7" dur="500" fill="hold"/>
+                                        <p:tgtEl>
+                                          <p:spTgt spid="6">
+                                            <p:txEl>
+                                              <p:pRg st="2" end="2"/>
+                                            </p:txEl>
+                                          </p:spTgt>
+                                        </p:tgtEl>
+                                        <p:attrNameLst>
+                                          <p:attrName>ppt_x</p:attrName>
+                                        </p:attrNameLst>
+                                      </p:cBhvr>
+                                      <p:tavLst>
+                                        <p:tav tm="0">
+                                          <p:val>
+                                            <p:strVal val="#ppt_x"/>
+                                          </p:val>
+                                        </p:tav>
+                                        <p:tav tm="100000">
+                                          <p:val>
+                                            <p:strVal val="#ppt_x"/>
+                                          </p:val>
+                                        </p:tav>
+                                      </p:tavLst>
+                                    </p:anim>
+                                    <p:anim calcmode="lin" valueType="num">
+                                      <p:cBhvr additive="base">
+                                        <p:cTn id="8" dur="500" fill="hold"/>
+                                        <p:tgtEl>
+                                          <p:spTgt spid="6">
+                                            <p:txEl>
+                                              <p:pRg st="2" end="2"/>
+                                            </p:txEl>
+                                          </p:spTgt>
+                                        </p:tgtEl>
+                                        <p:attrNameLst>
+                                          <p:attrName>ppt_y</p:attrName>
+                                        </p:attrNameLst>
+                                      </p:cBhvr>
+                                      <p:tavLst>
+                                        <p:tav tm="0">
+                                          <p:val>
+                                            <p:strVal val="1+#ppt_h/2"/>
+                                          </p:val>
+                                        </p:tav>
+                                        <p:tav tm="100000">
+                                          <p:val>
+                                            <p:strVal val="#ppt_y"/>
+                                          </p:val>
+                                        </p:tav>
+                                      </p:tavLst>
+                                    </p:anim>
+                                  </p:childTnLst>
+                                </p:cTn>
+                              </p:par>
+                            </p:childTnLst>
+                          </p:cTn>
+                        </p:par>
+                      </p:childTnLst>
+                    </p:cTn>
+                  </p:par>
+                  <p:par>
+                    <p:cTn id="9" fill="hold">
+                      <p:stCondLst>
+                        <p:cond delay="indefinite"/>
+                      </p:stCondLst>
+                      <p:childTnLst>
+                        <p:par>
+                          <p:cTn id="10" fill="hold">
+                            <p:stCondLst>
+                              <p:cond delay="0"/>
+                            </p:stCondLst>
+                            <p:childTnLst>
+                              <p:par>
+                                <p:cTn id="11" presetID="2" presetClass="entr" presetSubtype="4" fill="hold" nodeType="clickEffect">
+                                  <p:stCondLst>
+                                    <p:cond delay="0"/>
+                                  </p:stCondLst>
+                                  <p:childTnLst>
+                                    <p:set>
+                                      <p:cBhvr>
+                                        <p:cTn id="12" dur="1" fill="hold">
+                                          <p:stCondLst>
+                                            <p:cond delay="0"/>
+                                          </p:stCondLst>
+                                        </p:cTn>
+                                        <p:tgtEl>
+                                          <p:spTgt spid="6">
+                                            <p:txEl>
+                                              <p:pRg st="4" end="4"/>
+                                            </p:txEl>
+                                          </p:spTgt>
+                                        </p:tgtEl>
+                                        <p:attrNameLst>
+                                          <p:attrName>style.visibility</p:attrName>
+                                        </p:attrNameLst>
+                                      </p:cBhvr>
+                                      <p:to>
+                                        <p:strVal val="visible"/>
+                                      </p:to>
+                                    </p:set>
+                                    <p:anim calcmode="lin" valueType="num">
+                                      <p:cBhvr additive="base">
+                                        <p:cTn id="13" dur="500" fill="hold"/>
+                                        <p:tgtEl>
+                                          <p:spTgt spid="6">
+                                            <p:txEl>
+                                              <p:pRg st="4" end="4"/>
+                                            </p:txEl>
+                                          </p:spTgt>
+                                        </p:tgtEl>
+                                        <p:attrNameLst>
+                                          <p:attrName>ppt_x</p:attrName>
+                                        </p:attrNameLst>
+                                      </p:cBhvr>
+                                      <p:tavLst>
+                                        <p:tav tm="0">
+                                          <p:val>
+                                            <p:strVal val="#ppt_x"/>
+                                          </p:val>
+                                        </p:tav>
+                                        <p:tav tm="100000">
+                                          <p:val>
+                                            <p:strVal val="#ppt_x"/>
+                                          </p:val>
+                                        </p:tav>
+                                      </p:tavLst>
+                                    </p:anim>
+                                    <p:anim calcmode="lin" valueType="num">
+                                      <p:cBhvr additive="base">
+                                        <p:cTn id="14" dur="500" fill="hold"/>
+                                        <p:tgtEl>
+                                          <p:spTgt spid="6">
+                                            <p:txEl>
+                                              <p:pRg st="4" end="4"/>
+                                            </p:txEl>
+                                          </p:spTgt>
+                                        </p:tgtEl>
+                                        <p:attrNameLst>
+                                          <p:attrName>ppt_y</p:attrName>
+                                        </p:attrNameLst>
+                                      </p:cBhvr>
+                                      <p:tavLst>
+                                        <p:tav tm="0">
+                                          <p:val>
+                                            <p:strVal val="1+#ppt_h/2"/>
+                                          </p:val>
+                                        </p:tav>
+                                        <p:tav tm="100000">
+                                          <p:val>
+                                            <p:strVal val="#ppt_y"/>
+                                          </p:val>
+                                        </p:tav>
+                                      </p:tavLst>
+                                    </p:anim>
+                                  </p:childTnLst>
+                                </p:cTn>
+                              </p:par>
+                            </p:childTnLst>
+                          </p:cTn>
+                        </p:par>
+                      </p:childTnLst>
+                    </p:cTn>
+                  </p:par>
+                  <p:par>
+                    <p:cTn id="15" fill="hold">
+                      <p:stCondLst>
+                        <p:cond delay="indefinite"/>
+                      </p:stCondLst>
+                      <p:childTnLst>
+                        <p:par>
+                          <p:cTn id="16" fill="hold">
+                            <p:stCondLst>
+                              <p:cond delay="0"/>
+                            </p:stCondLst>
+                            <p:childTnLst>
+                              <p:par>
+                                <p:cTn id="17" presetID="2" presetClass="entr" presetSubtype="4" fill="hold" nodeType="clickEffect">
+                                  <p:stCondLst>
+                                    <p:cond delay="0"/>
+                                  </p:stCondLst>
+                                  <p:childTnLst>
+                                    <p:set>
+                                      <p:cBhvr>
+                                        <p:cTn id="18" dur="1" fill="hold">
+                                          <p:stCondLst>
+                                            <p:cond delay="0"/>
+                                          </p:stCondLst>
+                                        </p:cTn>
+                                        <p:tgtEl>
+                                          <p:spTgt spid="6">
+                                            <p:txEl>
+                                              <p:pRg st="6" end="6"/>
+                                            </p:txEl>
+                                          </p:spTgt>
+                                        </p:tgtEl>
+                                        <p:attrNameLst>
+                                          <p:attrName>style.visibility</p:attrName>
+                                        </p:attrNameLst>
+                                      </p:cBhvr>
+                                      <p:to>
+                                        <p:strVal val="visible"/>
+                                      </p:to>
+                                    </p:set>
+                                    <p:anim calcmode="lin" valueType="num">
+                                      <p:cBhvr additive="base">
+                                        <p:cTn id="19" dur="500" fill="hold"/>
+                                        <p:tgtEl>
+                                          <p:spTgt spid="6">
+                                            <p:txEl>
+                                              <p:pRg st="6" end="6"/>
+                                            </p:txEl>
+                                          </p:spTgt>
+                                        </p:tgtEl>
+                                        <p:attrNameLst>
+                                          <p:attrName>ppt_x</p:attrName>
+                                        </p:attrNameLst>
+                                      </p:cBhvr>
+                                      <p:tavLst>
+                                        <p:tav tm="0">
+                                          <p:val>
+                                            <p:strVal val="#ppt_x"/>
+                                          </p:val>
+                                        </p:tav>
+                                        <p:tav tm="100000">
+                                          <p:val>
+                                            <p:strVal val="#ppt_x"/>
+                                          </p:val>
+                                        </p:tav>
+                                      </p:tavLst>
+                                    </p:anim>
+                                    <p:anim calcmode="lin" valueType="num">
+                                      <p:cBhvr additive="base">
+                                        <p:cTn id="20" dur="500" fill="hold"/>
+                                        <p:tgtEl>
+                                          <p:spTgt spid="6">
+                                            <p:txEl>
+                                              <p:pRg st="6" end="6"/>
+                                            </p:txEl>
+                                          </p:spTgt>
+                                        </p:tgtEl>
+                                        <p:attrNameLst>
+                                          <p:attrName>ppt_y</p:attrName>
+                                        </p:attrNameLst>
+                                      </p:cBhvr>
+                                      <p:tavLst>
+                                        <p:tav tm="0">
+                                          <p:val>
+                                            <p:strVal val="1+#ppt_h/2"/>
+                                          </p:val>
+                                        </p:tav>
+                                        <p:tav tm="100000">
+                                          <p:val>
+                                            <p:strVal val="#ppt_y"/>
+                                          </p:val>
+                                        </p:tav>
+                                      </p:tavLst>
+                                    </p:anim>
+                                  </p:childTnLst>
+                                </p:cTn>
+                              </p:par>
+                            </p:childTnLst>
+                          </p:cTn>
+                        </p:par>
+                      </p:childTnLst>
+                    </p:cTn>
+                  </p:par>
+                  <p:par>
+                    <p:cTn id="21" fill="hold">
+                      <p:stCondLst>
+                        <p:cond delay="indefinite"/>
+                      </p:stCondLst>
+                      <p:childTnLst>
+                        <p:par>
+                          <p:cTn id="22" fill="hold">
+                            <p:stCondLst>
+                              <p:cond delay="0"/>
+                            </p:stCondLst>
+                            <p:childTnLst>
+                              <p:par>
+                                <p:cTn id="23" presetID="2" presetClass="entr" presetSubtype="4" fill="hold" nodeType="clickEffect">
+                                  <p:stCondLst>
+                                    <p:cond delay="0"/>
+                                  </p:stCondLst>
+                                  <p:childTnLst>
+                                    <p:set>
+                                      <p:cBhvr>
+                                        <p:cTn id="24" dur="1" fill="hold">
+                                          <p:stCondLst>
+                                            <p:cond delay="0"/>
+                                          </p:stCondLst>
+                                        </p:cTn>
+                                        <p:tgtEl>
+                                          <p:spTgt spid="6">
+                                            <p:txEl>
+                                              <p:pRg st="8" end="8"/>
+                                            </p:txEl>
+                                          </p:spTgt>
+                                        </p:tgtEl>
+                                        <p:attrNameLst>
+                                          <p:attrName>style.visibility</p:attrName>
+                                        </p:attrNameLst>
+                                      </p:cBhvr>
+                                      <p:to>
+                                        <p:strVal val="visible"/>
+                                      </p:to>
+                                    </p:set>
+                                    <p:anim calcmode="lin" valueType="num">
+                                      <p:cBhvr additive="base">
+                                        <p:cTn id="25" dur="500" fill="hold"/>
+                                        <p:tgtEl>
+                                          <p:spTgt spid="6">
+                                            <p:txEl>
+                                              <p:pRg st="8" end="8"/>
+                                            </p:txEl>
+                                          </p:spTgt>
+                                        </p:tgtEl>
+                                        <p:attrNameLst>
+                                          <p:attrName>ppt_x</p:attrName>
+                                        </p:attrNameLst>
+                                      </p:cBhvr>
+                                      <p:tavLst>
+                                        <p:tav tm="0">
+                                          <p:val>
+                                            <p:strVal val="#ppt_x"/>
+                                          </p:val>
+                                        </p:tav>
+                                        <p:tav tm="100000">
+                                          <p:val>
+                                            <p:strVal val="#ppt_x"/>
+                                          </p:val>
+                                        </p:tav>
+                                      </p:tavLst>
+                                    </p:anim>
+                                    <p:anim calcmode="lin" valueType="num">
+                                      <p:cBhvr additive="base">
+                                        <p:cTn id="26" dur="500" fill="hold"/>
+                                        <p:tgtEl>
+                                          <p:spTgt spid="6">
+                                            <p:txEl>
+                                              <p:pRg st="8" end="8"/>
+                                            </p:txEl>
+                                          </p:spTgt>
+                                        </p:tgtEl>
+                                        <p:attrNameLst>
+                                          <p:attrName>ppt_y</p:attrName>
+                                        </p:attrNameLst>
+                                      </p:cBhvr>
+                                      <p:tavLst>
+                                        <p:tav tm="0">
+                                          <p:val>
+                                            <p:strVal val="1+#ppt_h/2"/>
+                                          </p:val>
+                                        </p:tav>
+                                        <p:tav tm="100000">
+                                          <p:val>
+                                            <p:strVal val="#ppt_y"/>
+                                          </p:val>
+                                        </p:tav>
+                                      </p:tavLst>
+                                    </p:anim>
+                                  </p:childTnLst>
+                                </p:cTn>
+                              </p:par>
+                            </p:childTnLst>
+                          </p:cTn>
+                        </p:par>
+                      </p:childTnLst>
+                    </p:cTn>
+                  </p:par>
+                </p:childTnLst>
+              </p:cTn>
+              <p:prevCondLst>
+                <p:cond evt="onPrev" delay="0">
+                  <p:tgtEl>
+                    <p:sldTgt/>
+                  </p:tgtEl>
+                </p:cond>
+              </p:prevCondLst>
+              <p:nextCondLst>
+                <p:cond evt="onNext" delay="0">
+                  <p:tgtEl>
+                    <p:sldTgt/>
+                  </p:tgtEl>
+                </p:cond>
+              </p:nextCondLst>
+            </p:seq>
+          </p:childTnLst>
+        </p:cTn>
+      </p:par>
+    </p:tnLst>
+  </p:timing>
 </p:sld>
 </file>
 
@@ -29050,7 +31165,7 @@
         </p:spPr>
         <p:txBody>
           <a:bodyPr vert="horz" lIns="91440" tIns="45720" rIns="91440" bIns="45720" rtlCol="0">
-            <a:normAutofit/>
+            <a:normAutofit lnSpcReduction="10000"/>
           </a:bodyPr>
           <a:lstStyle>
             <a:lvl1pPr marL="0" indent="0" algn="l" defTabSz="457200" rtl="0" eaLnBrk="1" latinLnBrk="0" hangingPunct="1">
@@ -29325,7 +31440,7 @@
             </a:pPr>
             <a:r>
               <a:rPr lang="en-US" sz="2400" dirty="0"/>
-              <a:t>Basic IT Skills, Folders, Files, Windows Explorer</a:t>
+              <a:t>Basic IT Skills, Folders, Files, Windows Explorer, Suggested filing system</a:t>
             </a:r>
           </a:p>
           <a:p>
@@ -29352,6 +31467,19 @@
             <a:r>
               <a:rPr lang="en-US" sz="2400" dirty="0"/>
               <a:t>Email Etiquette, Attaching Files and Downloading Attachments</a:t>
+            </a:r>
+          </a:p>
+          <a:p>
+            <a:pPr marL="800100" lvl="1" indent="-342900" algn="l">
+              <a:buClr>
+                <a:schemeClr val="bg1"/>
+              </a:buClr>
+              <a:buFont typeface="Wingdings" pitchFamily="2" charset="2"/>
+              <a:buChar char="Ø"/>
+            </a:pPr>
+            <a:r>
+              <a:rPr lang="en-US" sz="2400" dirty="0"/>
+              <a:t>Bookmarks on browser</a:t>
             </a:r>
           </a:p>
           <a:p>
@@ -29845,6 +31973,300 @@
   <p:clrMapOvr>
     <a:overrideClrMapping bg1="lt1" tx1="dk1" bg2="lt2" tx2="dk2" accent1="accent1" accent2="accent2" accent3="accent3" accent4="accent4" accent5="accent5" accent6="accent6" hlink="hlink" folHlink="folHlink"/>
   </p:clrMapOvr>
+  <p:timing>
+    <p:tnLst>
+      <p:par>
+        <p:cTn id="1" dur="indefinite" restart="never" nodeType="tmRoot">
+          <p:childTnLst>
+            <p:seq concurrent="1" nextAc="seek">
+              <p:cTn id="2" dur="indefinite" nodeType="mainSeq">
+                <p:childTnLst>
+                  <p:par>
+                    <p:cTn id="3" fill="hold">
+                      <p:stCondLst>
+                        <p:cond delay="indefinite"/>
+                      </p:stCondLst>
+                      <p:childTnLst>
+                        <p:par>
+                          <p:cTn id="4" fill="hold">
+                            <p:stCondLst>
+                              <p:cond delay="0"/>
+                            </p:stCondLst>
+                            <p:childTnLst>
+                              <p:par>
+                                <p:cTn id="5" presetID="2" presetClass="entr" presetSubtype="4" fill="hold" nodeType="clickEffect">
+                                  <p:stCondLst>
+                                    <p:cond delay="0"/>
+                                  </p:stCondLst>
+                                  <p:childTnLst>
+                                    <p:set>
+                                      <p:cBhvr>
+                                        <p:cTn id="6" dur="1" fill="hold">
+                                          <p:stCondLst>
+                                            <p:cond delay="0"/>
+                                          </p:stCondLst>
+                                        </p:cTn>
+                                        <p:tgtEl>
+                                          <p:spTgt spid="3">
+                                            <p:txEl>
+                                              <p:pRg st="12" end="12"/>
+                                            </p:txEl>
+                                          </p:spTgt>
+                                        </p:tgtEl>
+                                        <p:attrNameLst>
+                                          <p:attrName>style.visibility</p:attrName>
+                                        </p:attrNameLst>
+                                      </p:cBhvr>
+                                      <p:to>
+                                        <p:strVal val="visible"/>
+                                      </p:to>
+                                    </p:set>
+                                    <p:anim calcmode="lin" valueType="num">
+                                      <p:cBhvr additive="base">
+                                        <p:cTn id="7" dur="500" fill="hold"/>
+                                        <p:tgtEl>
+                                          <p:spTgt spid="3">
+                                            <p:txEl>
+                                              <p:pRg st="12" end="12"/>
+                                            </p:txEl>
+                                          </p:spTgt>
+                                        </p:tgtEl>
+                                        <p:attrNameLst>
+                                          <p:attrName>ppt_x</p:attrName>
+                                        </p:attrNameLst>
+                                      </p:cBhvr>
+                                      <p:tavLst>
+                                        <p:tav tm="0">
+                                          <p:val>
+                                            <p:strVal val="#ppt_x"/>
+                                          </p:val>
+                                        </p:tav>
+                                        <p:tav tm="100000">
+                                          <p:val>
+                                            <p:strVal val="#ppt_x"/>
+                                          </p:val>
+                                        </p:tav>
+                                      </p:tavLst>
+                                    </p:anim>
+                                    <p:anim calcmode="lin" valueType="num">
+                                      <p:cBhvr additive="base">
+                                        <p:cTn id="8" dur="500" fill="hold"/>
+                                        <p:tgtEl>
+                                          <p:spTgt spid="3">
+                                            <p:txEl>
+                                              <p:pRg st="12" end="12"/>
+                                            </p:txEl>
+                                          </p:spTgt>
+                                        </p:tgtEl>
+                                        <p:attrNameLst>
+                                          <p:attrName>ppt_y</p:attrName>
+                                        </p:attrNameLst>
+                                      </p:cBhvr>
+                                      <p:tavLst>
+                                        <p:tav tm="0">
+                                          <p:val>
+                                            <p:strVal val="1+#ppt_h/2"/>
+                                          </p:val>
+                                        </p:tav>
+                                        <p:tav tm="100000">
+                                          <p:val>
+                                            <p:strVal val="#ppt_y"/>
+                                          </p:val>
+                                        </p:tav>
+                                      </p:tavLst>
+                                    </p:anim>
+                                  </p:childTnLst>
+                                </p:cTn>
+                              </p:par>
+                              <p:par>
+                                <p:cTn id="9" presetID="2" presetClass="entr" presetSubtype="4" fill="hold" nodeType="withEffect">
+                                  <p:stCondLst>
+                                    <p:cond delay="0"/>
+                                  </p:stCondLst>
+                                  <p:childTnLst>
+                                    <p:set>
+                                      <p:cBhvr>
+                                        <p:cTn id="10" dur="1" fill="hold">
+                                          <p:stCondLst>
+                                            <p:cond delay="0"/>
+                                          </p:stCondLst>
+                                        </p:cTn>
+                                        <p:tgtEl>
+                                          <p:spTgt spid="3">
+                                            <p:txEl>
+                                              <p:pRg st="13" end="13"/>
+                                            </p:txEl>
+                                          </p:spTgt>
+                                        </p:tgtEl>
+                                        <p:attrNameLst>
+                                          <p:attrName>style.visibility</p:attrName>
+                                        </p:attrNameLst>
+                                      </p:cBhvr>
+                                      <p:to>
+                                        <p:strVal val="visible"/>
+                                      </p:to>
+                                    </p:set>
+                                    <p:anim calcmode="lin" valueType="num">
+                                      <p:cBhvr additive="base">
+                                        <p:cTn id="11" dur="500" fill="hold"/>
+                                        <p:tgtEl>
+                                          <p:spTgt spid="3">
+                                            <p:txEl>
+                                              <p:pRg st="13" end="13"/>
+                                            </p:txEl>
+                                          </p:spTgt>
+                                        </p:tgtEl>
+                                        <p:attrNameLst>
+                                          <p:attrName>ppt_x</p:attrName>
+                                        </p:attrNameLst>
+                                      </p:cBhvr>
+                                      <p:tavLst>
+                                        <p:tav tm="0">
+                                          <p:val>
+                                            <p:strVal val="#ppt_x"/>
+                                          </p:val>
+                                        </p:tav>
+                                        <p:tav tm="100000">
+                                          <p:val>
+                                            <p:strVal val="#ppt_x"/>
+                                          </p:val>
+                                        </p:tav>
+                                      </p:tavLst>
+                                    </p:anim>
+                                    <p:anim calcmode="lin" valueType="num">
+                                      <p:cBhvr additive="base">
+                                        <p:cTn id="12" dur="500" fill="hold"/>
+                                        <p:tgtEl>
+                                          <p:spTgt spid="3">
+                                            <p:txEl>
+                                              <p:pRg st="13" end="13"/>
+                                            </p:txEl>
+                                          </p:spTgt>
+                                        </p:tgtEl>
+                                        <p:attrNameLst>
+                                          <p:attrName>ppt_y</p:attrName>
+                                        </p:attrNameLst>
+                                      </p:cBhvr>
+                                      <p:tavLst>
+                                        <p:tav tm="0">
+                                          <p:val>
+                                            <p:strVal val="1+#ppt_h/2"/>
+                                          </p:val>
+                                        </p:tav>
+                                        <p:tav tm="100000">
+                                          <p:val>
+                                            <p:strVal val="#ppt_y"/>
+                                          </p:val>
+                                        </p:tav>
+                                      </p:tavLst>
+                                    </p:anim>
+                                  </p:childTnLst>
+                                </p:cTn>
+                              </p:par>
+                              <p:par>
+                                <p:cTn id="13" presetID="2" presetClass="entr" presetSubtype="4" fill="hold" grpId="0" nodeType="withEffect">
+                                  <p:stCondLst>
+                                    <p:cond delay="0"/>
+                                  </p:stCondLst>
+                                  <p:childTnLst>
+                                    <p:set>
+                                      <p:cBhvr>
+                                        <p:cTn id="14" dur="1" fill="hold">
+                                          <p:stCondLst>
+                                            <p:cond delay="0"/>
+                                          </p:stCondLst>
+                                        </p:cTn>
+                                        <p:tgtEl>
+                                          <p:spTgt spid="4"/>
+                                        </p:tgtEl>
+                                        <p:attrNameLst>
+                                          <p:attrName>style.visibility</p:attrName>
+                                        </p:attrNameLst>
+                                      </p:cBhvr>
+                                      <p:to>
+                                        <p:strVal val="visible"/>
+                                      </p:to>
+                                    </p:set>
+                                    <p:anim calcmode="lin" valueType="num">
+                                      <p:cBhvr additive="base">
+                                        <p:cTn id="15" dur="500" fill="hold"/>
+                                        <p:tgtEl>
+                                          <p:spTgt spid="4"/>
+                                        </p:tgtEl>
+                                        <p:attrNameLst>
+                                          <p:attrName>ppt_x</p:attrName>
+                                        </p:attrNameLst>
+                                      </p:cBhvr>
+                                      <p:tavLst>
+                                        <p:tav tm="0">
+                                          <p:val>
+                                            <p:strVal val="#ppt_x"/>
+                                          </p:val>
+                                        </p:tav>
+                                        <p:tav tm="100000">
+                                          <p:val>
+                                            <p:strVal val="#ppt_x"/>
+                                          </p:val>
+                                        </p:tav>
+                                      </p:tavLst>
+                                    </p:anim>
+                                    <p:anim calcmode="lin" valueType="num">
+                                      <p:cBhvr additive="base">
+                                        <p:cTn id="16" dur="500" fill="hold"/>
+                                        <p:tgtEl>
+                                          <p:spTgt spid="4"/>
+                                        </p:tgtEl>
+                                        <p:attrNameLst>
+                                          <p:attrName>ppt_y</p:attrName>
+                                        </p:attrNameLst>
+                                      </p:cBhvr>
+                                      <p:tavLst>
+                                        <p:tav tm="0">
+                                          <p:val>
+                                            <p:strVal val="1+#ppt_h/2"/>
+                                          </p:val>
+                                        </p:tav>
+                                        <p:tav tm="100000">
+                                          <p:val>
+                                            <p:strVal val="#ppt_y"/>
+                                          </p:val>
+                                        </p:tav>
+                                      </p:tavLst>
+                                    </p:anim>
+                                  </p:childTnLst>
+                                </p:cTn>
+                              </p:par>
+                            </p:childTnLst>
+                          </p:cTn>
+                        </p:par>
+                      </p:childTnLst>
+                    </p:cTn>
+                  </p:par>
+                </p:childTnLst>
+              </p:cTn>
+              <p:prevCondLst>
+                <p:cond evt="onPrev" delay="0">
+                  <p:tgtEl>
+                    <p:sldTgt/>
+                  </p:tgtEl>
+                </p:cond>
+              </p:prevCondLst>
+              <p:nextCondLst>
+                <p:cond evt="onNext" delay="0">
+                  <p:tgtEl>
+                    <p:sldTgt/>
+                  </p:tgtEl>
+                </p:cond>
+              </p:nextCondLst>
+            </p:seq>
+          </p:childTnLst>
+        </p:cTn>
+      </p:par>
+    </p:tnLst>
+    <p:bldLst>
+      <p:bldP spid="4" grpId="0" animBg="1"/>
+    </p:bldLst>
+  </p:timing>
 </p:sld>
 </file>
 
@@ -29910,7 +32332,7 @@
         </p:nvSpPr>
         <p:spPr>
           <a:xfrm>
-            <a:off x="3687440" y="686989"/>
+            <a:off x="3377474" y="201790"/>
             <a:ext cx="4817120" cy="1190912"/>
           </a:xfrm>
         </p:spPr>
@@ -29949,7 +32371,7 @@
         </p:nvSpPr>
         <p:spPr>
           <a:xfrm>
-            <a:off x="5064368" y="1392702"/>
+            <a:off x="4599418" y="1157771"/>
             <a:ext cx="6541477" cy="5465297"/>
           </a:xfrm>
         </p:spPr>
@@ -30136,6 +32558,752 @@
   <p:clrMapOvr>
     <a:overrideClrMapping bg1="lt1" tx1="dk1" bg2="lt2" tx2="dk2" accent1="accent1" accent2="accent2" accent3="accent3" accent4="accent4" accent5="accent5" accent6="accent6" hlink="hlink" folHlink="folHlink"/>
   </p:clrMapOvr>
+  <p:timing>
+    <p:tnLst>
+      <p:par>
+        <p:cTn id="1" dur="indefinite" restart="never" nodeType="tmRoot">
+          <p:childTnLst>
+            <p:seq concurrent="1" nextAc="seek">
+              <p:cTn id="2" dur="indefinite" nodeType="mainSeq">
+                <p:childTnLst>
+                  <p:par>
+                    <p:cTn id="3" fill="hold">
+                      <p:stCondLst>
+                        <p:cond delay="indefinite"/>
+                      </p:stCondLst>
+                      <p:childTnLst>
+                        <p:par>
+                          <p:cTn id="4" fill="hold">
+                            <p:stCondLst>
+                              <p:cond delay="0"/>
+                            </p:stCondLst>
+                            <p:childTnLst>
+                              <p:par>
+                                <p:cTn id="5" presetID="2" presetClass="entr" presetSubtype="4" fill="hold" nodeType="clickEffect">
+                                  <p:stCondLst>
+                                    <p:cond delay="0"/>
+                                  </p:stCondLst>
+                                  <p:childTnLst>
+                                    <p:set>
+                                      <p:cBhvr>
+                                        <p:cTn id="6" dur="1" fill="hold">
+                                          <p:stCondLst>
+                                            <p:cond delay="0"/>
+                                          </p:stCondLst>
+                                        </p:cTn>
+                                        <p:tgtEl>
+                                          <p:spTgt spid="3">
+                                            <p:txEl>
+                                              <p:pRg st="0" end="0"/>
+                                            </p:txEl>
+                                          </p:spTgt>
+                                        </p:tgtEl>
+                                        <p:attrNameLst>
+                                          <p:attrName>style.visibility</p:attrName>
+                                        </p:attrNameLst>
+                                      </p:cBhvr>
+                                      <p:to>
+                                        <p:strVal val="visible"/>
+                                      </p:to>
+                                    </p:set>
+                                    <p:anim calcmode="lin" valueType="num">
+                                      <p:cBhvr additive="base">
+                                        <p:cTn id="7" dur="500" fill="hold"/>
+                                        <p:tgtEl>
+                                          <p:spTgt spid="3">
+                                            <p:txEl>
+                                              <p:pRg st="0" end="0"/>
+                                            </p:txEl>
+                                          </p:spTgt>
+                                        </p:tgtEl>
+                                        <p:attrNameLst>
+                                          <p:attrName>ppt_x</p:attrName>
+                                        </p:attrNameLst>
+                                      </p:cBhvr>
+                                      <p:tavLst>
+                                        <p:tav tm="0">
+                                          <p:val>
+                                            <p:strVal val="#ppt_x"/>
+                                          </p:val>
+                                        </p:tav>
+                                        <p:tav tm="100000">
+                                          <p:val>
+                                            <p:strVal val="#ppt_x"/>
+                                          </p:val>
+                                        </p:tav>
+                                      </p:tavLst>
+                                    </p:anim>
+                                    <p:anim calcmode="lin" valueType="num">
+                                      <p:cBhvr additive="base">
+                                        <p:cTn id="8" dur="500" fill="hold"/>
+                                        <p:tgtEl>
+                                          <p:spTgt spid="3">
+                                            <p:txEl>
+                                              <p:pRg st="0" end="0"/>
+                                            </p:txEl>
+                                          </p:spTgt>
+                                        </p:tgtEl>
+                                        <p:attrNameLst>
+                                          <p:attrName>ppt_y</p:attrName>
+                                        </p:attrNameLst>
+                                      </p:cBhvr>
+                                      <p:tavLst>
+                                        <p:tav tm="0">
+                                          <p:val>
+                                            <p:strVal val="1+#ppt_h/2"/>
+                                          </p:val>
+                                        </p:tav>
+                                        <p:tav tm="100000">
+                                          <p:val>
+                                            <p:strVal val="#ppt_y"/>
+                                          </p:val>
+                                        </p:tav>
+                                      </p:tavLst>
+                                    </p:anim>
+                                  </p:childTnLst>
+                                </p:cTn>
+                              </p:par>
+                              <p:par>
+                                <p:cTn id="9" presetID="2" presetClass="entr" presetSubtype="4" fill="hold" nodeType="withEffect">
+                                  <p:stCondLst>
+                                    <p:cond delay="0"/>
+                                  </p:stCondLst>
+                                  <p:childTnLst>
+                                    <p:set>
+                                      <p:cBhvr>
+                                        <p:cTn id="10" dur="1" fill="hold">
+                                          <p:stCondLst>
+                                            <p:cond delay="0"/>
+                                          </p:stCondLst>
+                                        </p:cTn>
+                                        <p:tgtEl>
+                                          <p:spTgt spid="3">
+                                            <p:txEl>
+                                              <p:pRg st="1" end="1"/>
+                                            </p:txEl>
+                                          </p:spTgt>
+                                        </p:tgtEl>
+                                        <p:attrNameLst>
+                                          <p:attrName>style.visibility</p:attrName>
+                                        </p:attrNameLst>
+                                      </p:cBhvr>
+                                      <p:to>
+                                        <p:strVal val="visible"/>
+                                      </p:to>
+                                    </p:set>
+                                    <p:anim calcmode="lin" valueType="num">
+                                      <p:cBhvr additive="base">
+                                        <p:cTn id="11" dur="500" fill="hold"/>
+                                        <p:tgtEl>
+                                          <p:spTgt spid="3">
+                                            <p:txEl>
+                                              <p:pRg st="1" end="1"/>
+                                            </p:txEl>
+                                          </p:spTgt>
+                                        </p:tgtEl>
+                                        <p:attrNameLst>
+                                          <p:attrName>ppt_x</p:attrName>
+                                        </p:attrNameLst>
+                                      </p:cBhvr>
+                                      <p:tavLst>
+                                        <p:tav tm="0">
+                                          <p:val>
+                                            <p:strVal val="#ppt_x"/>
+                                          </p:val>
+                                        </p:tav>
+                                        <p:tav tm="100000">
+                                          <p:val>
+                                            <p:strVal val="#ppt_x"/>
+                                          </p:val>
+                                        </p:tav>
+                                      </p:tavLst>
+                                    </p:anim>
+                                    <p:anim calcmode="lin" valueType="num">
+                                      <p:cBhvr additive="base">
+                                        <p:cTn id="12" dur="500" fill="hold"/>
+                                        <p:tgtEl>
+                                          <p:spTgt spid="3">
+                                            <p:txEl>
+                                              <p:pRg st="1" end="1"/>
+                                            </p:txEl>
+                                          </p:spTgt>
+                                        </p:tgtEl>
+                                        <p:attrNameLst>
+                                          <p:attrName>ppt_y</p:attrName>
+                                        </p:attrNameLst>
+                                      </p:cBhvr>
+                                      <p:tavLst>
+                                        <p:tav tm="0">
+                                          <p:val>
+                                            <p:strVal val="1+#ppt_h/2"/>
+                                          </p:val>
+                                        </p:tav>
+                                        <p:tav tm="100000">
+                                          <p:val>
+                                            <p:strVal val="#ppt_y"/>
+                                          </p:val>
+                                        </p:tav>
+                                      </p:tavLst>
+                                    </p:anim>
+                                  </p:childTnLst>
+                                </p:cTn>
+                              </p:par>
+                              <p:par>
+                                <p:cTn id="13" presetID="2" presetClass="entr" presetSubtype="4" fill="hold" nodeType="withEffect">
+                                  <p:stCondLst>
+                                    <p:cond delay="0"/>
+                                  </p:stCondLst>
+                                  <p:childTnLst>
+                                    <p:set>
+                                      <p:cBhvr>
+                                        <p:cTn id="14" dur="1" fill="hold">
+                                          <p:stCondLst>
+                                            <p:cond delay="0"/>
+                                          </p:stCondLst>
+                                        </p:cTn>
+                                        <p:tgtEl>
+                                          <p:spTgt spid="3">
+                                            <p:txEl>
+                                              <p:pRg st="2" end="2"/>
+                                            </p:txEl>
+                                          </p:spTgt>
+                                        </p:tgtEl>
+                                        <p:attrNameLst>
+                                          <p:attrName>style.visibility</p:attrName>
+                                        </p:attrNameLst>
+                                      </p:cBhvr>
+                                      <p:to>
+                                        <p:strVal val="visible"/>
+                                      </p:to>
+                                    </p:set>
+                                    <p:anim calcmode="lin" valueType="num">
+                                      <p:cBhvr additive="base">
+                                        <p:cTn id="15" dur="500" fill="hold"/>
+                                        <p:tgtEl>
+                                          <p:spTgt spid="3">
+                                            <p:txEl>
+                                              <p:pRg st="2" end="2"/>
+                                            </p:txEl>
+                                          </p:spTgt>
+                                        </p:tgtEl>
+                                        <p:attrNameLst>
+                                          <p:attrName>ppt_x</p:attrName>
+                                        </p:attrNameLst>
+                                      </p:cBhvr>
+                                      <p:tavLst>
+                                        <p:tav tm="0">
+                                          <p:val>
+                                            <p:strVal val="#ppt_x"/>
+                                          </p:val>
+                                        </p:tav>
+                                        <p:tav tm="100000">
+                                          <p:val>
+                                            <p:strVal val="#ppt_x"/>
+                                          </p:val>
+                                        </p:tav>
+                                      </p:tavLst>
+                                    </p:anim>
+                                    <p:anim calcmode="lin" valueType="num">
+                                      <p:cBhvr additive="base">
+                                        <p:cTn id="16" dur="500" fill="hold"/>
+                                        <p:tgtEl>
+                                          <p:spTgt spid="3">
+                                            <p:txEl>
+                                              <p:pRg st="2" end="2"/>
+                                            </p:txEl>
+                                          </p:spTgt>
+                                        </p:tgtEl>
+                                        <p:attrNameLst>
+                                          <p:attrName>ppt_y</p:attrName>
+                                        </p:attrNameLst>
+                                      </p:cBhvr>
+                                      <p:tavLst>
+                                        <p:tav tm="0">
+                                          <p:val>
+                                            <p:strVal val="1+#ppt_h/2"/>
+                                          </p:val>
+                                        </p:tav>
+                                        <p:tav tm="100000">
+                                          <p:val>
+                                            <p:strVal val="#ppt_y"/>
+                                          </p:val>
+                                        </p:tav>
+                                      </p:tavLst>
+                                    </p:anim>
+                                  </p:childTnLst>
+                                </p:cTn>
+                              </p:par>
+                              <p:par>
+                                <p:cTn id="17" presetID="2" presetClass="entr" presetSubtype="4" fill="hold" nodeType="withEffect">
+                                  <p:stCondLst>
+                                    <p:cond delay="0"/>
+                                  </p:stCondLst>
+                                  <p:childTnLst>
+                                    <p:set>
+                                      <p:cBhvr>
+                                        <p:cTn id="18" dur="1" fill="hold">
+                                          <p:stCondLst>
+                                            <p:cond delay="0"/>
+                                          </p:stCondLst>
+                                        </p:cTn>
+                                        <p:tgtEl>
+                                          <p:spTgt spid="3">
+                                            <p:txEl>
+                                              <p:pRg st="3" end="3"/>
+                                            </p:txEl>
+                                          </p:spTgt>
+                                        </p:tgtEl>
+                                        <p:attrNameLst>
+                                          <p:attrName>style.visibility</p:attrName>
+                                        </p:attrNameLst>
+                                      </p:cBhvr>
+                                      <p:to>
+                                        <p:strVal val="visible"/>
+                                      </p:to>
+                                    </p:set>
+                                    <p:anim calcmode="lin" valueType="num">
+                                      <p:cBhvr additive="base">
+                                        <p:cTn id="19" dur="500" fill="hold"/>
+                                        <p:tgtEl>
+                                          <p:spTgt spid="3">
+                                            <p:txEl>
+                                              <p:pRg st="3" end="3"/>
+                                            </p:txEl>
+                                          </p:spTgt>
+                                        </p:tgtEl>
+                                        <p:attrNameLst>
+                                          <p:attrName>ppt_x</p:attrName>
+                                        </p:attrNameLst>
+                                      </p:cBhvr>
+                                      <p:tavLst>
+                                        <p:tav tm="0">
+                                          <p:val>
+                                            <p:strVal val="#ppt_x"/>
+                                          </p:val>
+                                        </p:tav>
+                                        <p:tav tm="100000">
+                                          <p:val>
+                                            <p:strVal val="#ppt_x"/>
+                                          </p:val>
+                                        </p:tav>
+                                      </p:tavLst>
+                                    </p:anim>
+                                    <p:anim calcmode="lin" valueType="num">
+                                      <p:cBhvr additive="base">
+                                        <p:cTn id="20" dur="500" fill="hold"/>
+                                        <p:tgtEl>
+                                          <p:spTgt spid="3">
+                                            <p:txEl>
+                                              <p:pRg st="3" end="3"/>
+                                            </p:txEl>
+                                          </p:spTgt>
+                                        </p:tgtEl>
+                                        <p:attrNameLst>
+                                          <p:attrName>ppt_y</p:attrName>
+                                        </p:attrNameLst>
+                                      </p:cBhvr>
+                                      <p:tavLst>
+                                        <p:tav tm="0">
+                                          <p:val>
+                                            <p:strVal val="1+#ppt_h/2"/>
+                                          </p:val>
+                                        </p:tav>
+                                        <p:tav tm="100000">
+                                          <p:val>
+                                            <p:strVal val="#ppt_y"/>
+                                          </p:val>
+                                        </p:tav>
+                                      </p:tavLst>
+                                    </p:anim>
+                                  </p:childTnLst>
+                                </p:cTn>
+                              </p:par>
+                            </p:childTnLst>
+                          </p:cTn>
+                        </p:par>
+                      </p:childTnLst>
+                    </p:cTn>
+                  </p:par>
+                  <p:par>
+                    <p:cTn id="21" fill="hold">
+                      <p:stCondLst>
+                        <p:cond delay="indefinite"/>
+                      </p:stCondLst>
+                      <p:childTnLst>
+                        <p:par>
+                          <p:cTn id="22" fill="hold">
+                            <p:stCondLst>
+                              <p:cond delay="0"/>
+                            </p:stCondLst>
+                            <p:childTnLst>
+                              <p:par>
+                                <p:cTn id="23" presetID="2" presetClass="entr" presetSubtype="4" fill="hold" nodeType="clickEffect">
+                                  <p:stCondLst>
+                                    <p:cond delay="0"/>
+                                  </p:stCondLst>
+                                  <p:childTnLst>
+                                    <p:set>
+                                      <p:cBhvr>
+                                        <p:cTn id="24" dur="1" fill="hold">
+                                          <p:stCondLst>
+                                            <p:cond delay="0"/>
+                                          </p:stCondLst>
+                                        </p:cTn>
+                                        <p:tgtEl>
+                                          <p:spTgt spid="3">
+                                            <p:txEl>
+                                              <p:pRg st="4" end="4"/>
+                                            </p:txEl>
+                                          </p:spTgt>
+                                        </p:tgtEl>
+                                        <p:attrNameLst>
+                                          <p:attrName>style.visibility</p:attrName>
+                                        </p:attrNameLst>
+                                      </p:cBhvr>
+                                      <p:to>
+                                        <p:strVal val="visible"/>
+                                      </p:to>
+                                    </p:set>
+                                    <p:anim calcmode="lin" valueType="num">
+                                      <p:cBhvr additive="base">
+                                        <p:cTn id="25" dur="500" fill="hold"/>
+                                        <p:tgtEl>
+                                          <p:spTgt spid="3">
+                                            <p:txEl>
+                                              <p:pRg st="4" end="4"/>
+                                            </p:txEl>
+                                          </p:spTgt>
+                                        </p:tgtEl>
+                                        <p:attrNameLst>
+                                          <p:attrName>ppt_x</p:attrName>
+                                        </p:attrNameLst>
+                                      </p:cBhvr>
+                                      <p:tavLst>
+                                        <p:tav tm="0">
+                                          <p:val>
+                                            <p:strVal val="#ppt_x"/>
+                                          </p:val>
+                                        </p:tav>
+                                        <p:tav tm="100000">
+                                          <p:val>
+                                            <p:strVal val="#ppt_x"/>
+                                          </p:val>
+                                        </p:tav>
+                                      </p:tavLst>
+                                    </p:anim>
+                                    <p:anim calcmode="lin" valueType="num">
+                                      <p:cBhvr additive="base">
+                                        <p:cTn id="26" dur="500" fill="hold"/>
+                                        <p:tgtEl>
+                                          <p:spTgt spid="3">
+                                            <p:txEl>
+                                              <p:pRg st="4" end="4"/>
+                                            </p:txEl>
+                                          </p:spTgt>
+                                        </p:tgtEl>
+                                        <p:attrNameLst>
+                                          <p:attrName>ppt_y</p:attrName>
+                                        </p:attrNameLst>
+                                      </p:cBhvr>
+                                      <p:tavLst>
+                                        <p:tav tm="0">
+                                          <p:val>
+                                            <p:strVal val="1+#ppt_h/2"/>
+                                          </p:val>
+                                        </p:tav>
+                                        <p:tav tm="100000">
+                                          <p:val>
+                                            <p:strVal val="#ppt_y"/>
+                                          </p:val>
+                                        </p:tav>
+                                      </p:tavLst>
+                                    </p:anim>
+                                  </p:childTnLst>
+                                </p:cTn>
+                              </p:par>
+                              <p:par>
+                                <p:cTn id="27" presetID="2" presetClass="entr" presetSubtype="4" fill="hold" nodeType="withEffect">
+                                  <p:stCondLst>
+                                    <p:cond delay="0"/>
+                                  </p:stCondLst>
+                                  <p:childTnLst>
+                                    <p:set>
+                                      <p:cBhvr>
+                                        <p:cTn id="28" dur="1" fill="hold">
+                                          <p:stCondLst>
+                                            <p:cond delay="0"/>
+                                          </p:stCondLst>
+                                        </p:cTn>
+                                        <p:tgtEl>
+                                          <p:spTgt spid="3">
+                                            <p:txEl>
+                                              <p:pRg st="5" end="5"/>
+                                            </p:txEl>
+                                          </p:spTgt>
+                                        </p:tgtEl>
+                                        <p:attrNameLst>
+                                          <p:attrName>style.visibility</p:attrName>
+                                        </p:attrNameLst>
+                                      </p:cBhvr>
+                                      <p:to>
+                                        <p:strVal val="visible"/>
+                                      </p:to>
+                                    </p:set>
+                                    <p:anim calcmode="lin" valueType="num">
+                                      <p:cBhvr additive="base">
+                                        <p:cTn id="29" dur="500" fill="hold"/>
+                                        <p:tgtEl>
+                                          <p:spTgt spid="3">
+                                            <p:txEl>
+                                              <p:pRg st="5" end="5"/>
+                                            </p:txEl>
+                                          </p:spTgt>
+                                        </p:tgtEl>
+                                        <p:attrNameLst>
+                                          <p:attrName>ppt_x</p:attrName>
+                                        </p:attrNameLst>
+                                      </p:cBhvr>
+                                      <p:tavLst>
+                                        <p:tav tm="0">
+                                          <p:val>
+                                            <p:strVal val="#ppt_x"/>
+                                          </p:val>
+                                        </p:tav>
+                                        <p:tav tm="100000">
+                                          <p:val>
+                                            <p:strVal val="#ppt_x"/>
+                                          </p:val>
+                                        </p:tav>
+                                      </p:tavLst>
+                                    </p:anim>
+                                    <p:anim calcmode="lin" valueType="num">
+                                      <p:cBhvr additive="base">
+                                        <p:cTn id="30" dur="500" fill="hold"/>
+                                        <p:tgtEl>
+                                          <p:spTgt spid="3">
+                                            <p:txEl>
+                                              <p:pRg st="5" end="5"/>
+                                            </p:txEl>
+                                          </p:spTgt>
+                                        </p:tgtEl>
+                                        <p:attrNameLst>
+                                          <p:attrName>ppt_y</p:attrName>
+                                        </p:attrNameLst>
+                                      </p:cBhvr>
+                                      <p:tavLst>
+                                        <p:tav tm="0">
+                                          <p:val>
+                                            <p:strVal val="1+#ppt_h/2"/>
+                                          </p:val>
+                                        </p:tav>
+                                        <p:tav tm="100000">
+                                          <p:val>
+                                            <p:strVal val="#ppt_y"/>
+                                          </p:val>
+                                        </p:tav>
+                                      </p:tavLst>
+                                    </p:anim>
+                                  </p:childTnLst>
+                                </p:cTn>
+                              </p:par>
+                              <p:par>
+                                <p:cTn id="31" presetID="2" presetClass="entr" presetSubtype="4" fill="hold" nodeType="withEffect">
+                                  <p:stCondLst>
+                                    <p:cond delay="0"/>
+                                  </p:stCondLst>
+                                  <p:childTnLst>
+                                    <p:set>
+                                      <p:cBhvr>
+                                        <p:cTn id="32" dur="1" fill="hold">
+                                          <p:stCondLst>
+                                            <p:cond delay="0"/>
+                                          </p:stCondLst>
+                                        </p:cTn>
+                                        <p:tgtEl>
+                                          <p:spTgt spid="3">
+                                            <p:txEl>
+                                              <p:pRg st="6" end="6"/>
+                                            </p:txEl>
+                                          </p:spTgt>
+                                        </p:tgtEl>
+                                        <p:attrNameLst>
+                                          <p:attrName>style.visibility</p:attrName>
+                                        </p:attrNameLst>
+                                      </p:cBhvr>
+                                      <p:to>
+                                        <p:strVal val="visible"/>
+                                      </p:to>
+                                    </p:set>
+                                    <p:anim calcmode="lin" valueType="num">
+                                      <p:cBhvr additive="base">
+                                        <p:cTn id="33" dur="500" fill="hold"/>
+                                        <p:tgtEl>
+                                          <p:spTgt spid="3">
+                                            <p:txEl>
+                                              <p:pRg st="6" end="6"/>
+                                            </p:txEl>
+                                          </p:spTgt>
+                                        </p:tgtEl>
+                                        <p:attrNameLst>
+                                          <p:attrName>ppt_x</p:attrName>
+                                        </p:attrNameLst>
+                                      </p:cBhvr>
+                                      <p:tavLst>
+                                        <p:tav tm="0">
+                                          <p:val>
+                                            <p:strVal val="#ppt_x"/>
+                                          </p:val>
+                                        </p:tav>
+                                        <p:tav tm="100000">
+                                          <p:val>
+                                            <p:strVal val="#ppt_x"/>
+                                          </p:val>
+                                        </p:tav>
+                                      </p:tavLst>
+                                    </p:anim>
+                                    <p:anim calcmode="lin" valueType="num">
+                                      <p:cBhvr additive="base">
+                                        <p:cTn id="34" dur="500" fill="hold"/>
+                                        <p:tgtEl>
+                                          <p:spTgt spid="3">
+                                            <p:txEl>
+                                              <p:pRg st="6" end="6"/>
+                                            </p:txEl>
+                                          </p:spTgt>
+                                        </p:tgtEl>
+                                        <p:attrNameLst>
+                                          <p:attrName>ppt_y</p:attrName>
+                                        </p:attrNameLst>
+                                      </p:cBhvr>
+                                      <p:tavLst>
+                                        <p:tav tm="0">
+                                          <p:val>
+                                            <p:strVal val="1+#ppt_h/2"/>
+                                          </p:val>
+                                        </p:tav>
+                                        <p:tav tm="100000">
+                                          <p:val>
+                                            <p:strVal val="#ppt_y"/>
+                                          </p:val>
+                                        </p:tav>
+                                      </p:tavLst>
+                                    </p:anim>
+                                  </p:childTnLst>
+                                </p:cTn>
+                              </p:par>
+                              <p:par>
+                                <p:cTn id="35" presetID="2" presetClass="entr" presetSubtype="4" fill="hold" nodeType="withEffect">
+                                  <p:stCondLst>
+                                    <p:cond delay="0"/>
+                                  </p:stCondLst>
+                                  <p:childTnLst>
+                                    <p:set>
+                                      <p:cBhvr>
+                                        <p:cTn id="36" dur="1" fill="hold">
+                                          <p:stCondLst>
+                                            <p:cond delay="0"/>
+                                          </p:stCondLst>
+                                        </p:cTn>
+                                        <p:tgtEl>
+                                          <p:spTgt spid="3">
+                                            <p:txEl>
+                                              <p:pRg st="7" end="7"/>
+                                            </p:txEl>
+                                          </p:spTgt>
+                                        </p:tgtEl>
+                                        <p:attrNameLst>
+                                          <p:attrName>style.visibility</p:attrName>
+                                        </p:attrNameLst>
+                                      </p:cBhvr>
+                                      <p:to>
+                                        <p:strVal val="visible"/>
+                                      </p:to>
+                                    </p:set>
+                                    <p:anim calcmode="lin" valueType="num">
+                                      <p:cBhvr additive="base">
+                                        <p:cTn id="37" dur="500" fill="hold"/>
+                                        <p:tgtEl>
+                                          <p:spTgt spid="3">
+                                            <p:txEl>
+                                              <p:pRg st="7" end="7"/>
+                                            </p:txEl>
+                                          </p:spTgt>
+                                        </p:tgtEl>
+                                        <p:attrNameLst>
+                                          <p:attrName>ppt_x</p:attrName>
+                                        </p:attrNameLst>
+                                      </p:cBhvr>
+                                      <p:tavLst>
+                                        <p:tav tm="0">
+                                          <p:val>
+                                            <p:strVal val="#ppt_x"/>
+                                          </p:val>
+                                        </p:tav>
+                                        <p:tav tm="100000">
+                                          <p:val>
+                                            <p:strVal val="#ppt_x"/>
+                                          </p:val>
+                                        </p:tav>
+                                      </p:tavLst>
+                                    </p:anim>
+                                    <p:anim calcmode="lin" valueType="num">
+                                      <p:cBhvr additive="base">
+                                        <p:cTn id="38" dur="500" fill="hold"/>
+                                        <p:tgtEl>
+                                          <p:spTgt spid="3">
+                                            <p:txEl>
+                                              <p:pRg st="7" end="7"/>
+                                            </p:txEl>
+                                          </p:spTgt>
+                                        </p:tgtEl>
+                                        <p:attrNameLst>
+                                          <p:attrName>ppt_y</p:attrName>
+                                        </p:attrNameLst>
+                                      </p:cBhvr>
+                                      <p:tavLst>
+                                        <p:tav tm="0">
+                                          <p:val>
+                                            <p:strVal val="1+#ppt_h/2"/>
+                                          </p:val>
+                                        </p:tav>
+                                        <p:tav tm="100000">
+                                          <p:val>
+                                            <p:strVal val="#ppt_y"/>
+                                          </p:val>
+                                        </p:tav>
+                                      </p:tavLst>
+                                    </p:anim>
+                                  </p:childTnLst>
+                                </p:cTn>
+                              </p:par>
+                            </p:childTnLst>
+                          </p:cTn>
+                        </p:par>
+                      </p:childTnLst>
+                    </p:cTn>
+                  </p:par>
+                </p:childTnLst>
+              </p:cTn>
+              <p:prevCondLst>
+                <p:cond evt="onPrev" delay="0">
+                  <p:tgtEl>
+                    <p:sldTgt/>
+                  </p:tgtEl>
+                </p:cond>
+              </p:prevCondLst>
+              <p:nextCondLst>
+                <p:cond evt="onNext" delay="0">
+                  <p:tgtEl>
+                    <p:sldTgt/>
+                  </p:tgtEl>
+                </p:cond>
+              </p:nextCondLst>
+            </p:seq>
+          </p:childTnLst>
+        </p:cTn>
+      </p:par>
+    </p:tnLst>
+  </p:timing>
 </p:sld>
 </file>
 

</xml_diff>